<commit_message>
Added API and demo
</commit_message>
<xml_diff>
--- a/Async Programming in Android with ReactiveX.pptx
+++ b/Async Programming in Android with ReactiveX.pptx
@@ -4,6 +4,9 @@
   <p:sldMasterIdLst>
     <p:sldMasterId id="2147483660" r:id="rId1"/>
   </p:sldMasterIdLst>
+  <p:notesMasterIdLst>
+    <p:notesMasterId r:id="rId15"/>
+  </p:notesMasterIdLst>
   <p:sldIdLst>
     <p:sldId id="256" r:id="rId2"/>
     <p:sldId id="259" r:id="rId3"/>
@@ -14,9 +17,9 @@
     <p:sldId id="261" r:id="rId8"/>
     <p:sldId id="263" r:id="rId9"/>
     <p:sldId id="264" r:id="rId10"/>
-    <p:sldId id="265" r:id="rId11"/>
-    <p:sldId id="266" r:id="rId12"/>
-    <p:sldId id="267" r:id="rId13"/>
+    <p:sldId id="270" r:id="rId11"/>
+    <p:sldId id="271" r:id="rId12"/>
+    <p:sldId id="272" r:id="rId13"/>
     <p:sldId id="268" r:id="rId14"/>
   </p:sldIdLst>
   <p:sldSz cx="12192000" cy="6858000"/>
@@ -161,6 +164,356 @@
 </inkml:ink>
 </file>
 
+<file path=ppt/notesMasters/notesMaster1.xml><?xml version="1.0" encoding="utf-8"?>
+<p:notesMaster xmlns:a="http://schemas.openxmlformats.org/drawingml/2006/main" xmlns:r="http://schemas.openxmlformats.org/officeDocument/2006/relationships" xmlns:p="http://schemas.openxmlformats.org/presentationml/2006/main">
+  <p:cSld>
+    <p:bg>
+      <p:bgRef idx="1001">
+        <a:schemeClr val="bg1"/>
+      </p:bgRef>
+    </p:bg>
+    <p:spTree>
+      <p:nvGrpSpPr>
+        <p:cNvPr id="1" name=""/>
+        <p:cNvGrpSpPr/>
+        <p:nvPr/>
+      </p:nvGrpSpPr>
+      <p:grpSpPr>
+        <a:xfrm>
+          <a:off x="0" y="0"/>
+          <a:ext cx="0" cy="0"/>
+          <a:chOff x="0" y="0"/>
+          <a:chExt cx="0" cy="0"/>
+        </a:xfrm>
+      </p:grpSpPr>
+      <p:sp>
+        <p:nvSpPr>
+          <p:cNvPr id="2" name="Header Placeholder 1"/>
+          <p:cNvSpPr>
+            <a:spLocks noGrp="1"/>
+          </p:cNvSpPr>
+          <p:nvPr>
+            <p:ph type="hdr" sz="quarter"/>
+          </p:nvPr>
+        </p:nvSpPr>
+        <p:spPr>
+          <a:xfrm>
+            <a:off x="0" y="0"/>
+            <a:ext cx="2971800" cy="458788"/>
+          </a:xfrm>
+          <a:prstGeom prst="rect">
+            <a:avLst/>
+          </a:prstGeom>
+        </p:spPr>
+        <p:txBody>
+          <a:bodyPr vert="horz" lIns="91440" tIns="45720" rIns="91440" bIns="45720" rtlCol="0"/>
+          <a:lstStyle>
+            <a:lvl1pPr algn="l">
+              <a:defRPr sz="1200"/>
+            </a:lvl1pPr>
+          </a:lstStyle>
+          <a:p>
+            <a:endParaRPr lang="en-US"/>
+          </a:p>
+        </p:txBody>
+      </p:sp>
+      <p:sp>
+        <p:nvSpPr>
+          <p:cNvPr id="3" name="Date Placeholder 2"/>
+          <p:cNvSpPr>
+            <a:spLocks noGrp="1"/>
+          </p:cNvSpPr>
+          <p:nvPr>
+            <p:ph type="dt" idx="1"/>
+          </p:nvPr>
+        </p:nvSpPr>
+        <p:spPr>
+          <a:xfrm>
+            <a:off x="3884613" y="0"/>
+            <a:ext cx="2971800" cy="458788"/>
+          </a:xfrm>
+          <a:prstGeom prst="rect">
+            <a:avLst/>
+          </a:prstGeom>
+        </p:spPr>
+        <p:txBody>
+          <a:bodyPr vert="horz" lIns="91440" tIns="45720" rIns="91440" bIns="45720" rtlCol="0"/>
+          <a:lstStyle>
+            <a:lvl1pPr algn="r">
+              <a:defRPr sz="1200"/>
+            </a:lvl1pPr>
+          </a:lstStyle>
+          <a:p>
+            <a:fld id="{15A8A3C4-A27D-5D45-BE42-434B5B462BC0}" type="datetimeFigureOut">
+              <a:rPr lang="en-US" smtClean="0"/>
+              <a:t>10/18/17</a:t>
+            </a:fld>
+            <a:endParaRPr lang="en-US"/>
+          </a:p>
+        </p:txBody>
+      </p:sp>
+      <p:sp>
+        <p:nvSpPr>
+          <p:cNvPr id="4" name="Slide Image Placeholder 3"/>
+          <p:cNvSpPr>
+            <a:spLocks noGrp="1" noRot="1" noChangeAspect="1"/>
+          </p:cNvSpPr>
+          <p:nvPr>
+            <p:ph type="sldImg" idx="2"/>
+          </p:nvPr>
+        </p:nvSpPr>
+        <p:spPr>
+          <a:xfrm>
+            <a:off x="685800" y="1143000"/>
+            <a:ext cx="5486400" cy="3086100"/>
+          </a:xfrm>
+          <a:prstGeom prst="rect">
+            <a:avLst/>
+          </a:prstGeom>
+          <a:noFill/>
+          <a:ln w="12700">
+            <a:solidFill>
+              <a:prstClr val="black"/>
+            </a:solidFill>
+          </a:ln>
+        </p:spPr>
+        <p:txBody>
+          <a:bodyPr vert="horz" lIns="91440" tIns="45720" rIns="91440" bIns="45720" rtlCol="0" anchor="ctr"/>
+          <a:lstStyle/>
+          <a:p>
+            <a:endParaRPr lang="en-US"/>
+          </a:p>
+        </p:txBody>
+      </p:sp>
+      <p:sp>
+        <p:nvSpPr>
+          <p:cNvPr id="5" name="Notes Placeholder 4"/>
+          <p:cNvSpPr>
+            <a:spLocks noGrp="1"/>
+          </p:cNvSpPr>
+          <p:nvPr>
+            <p:ph type="body" sz="quarter" idx="3"/>
+          </p:nvPr>
+        </p:nvSpPr>
+        <p:spPr>
+          <a:xfrm>
+            <a:off x="685800" y="4400550"/>
+            <a:ext cx="5486400" cy="3600450"/>
+          </a:xfrm>
+          <a:prstGeom prst="rect">
+            <a:avLst/>
+          </a:prstGeom>
+        </p:spPr>
+        <p:txBody>
+          <a:bodyPr vert="horz" lIns="91440" tIns="45720" rIns="91440" bIns="45720" rtlCol="0"/>
+          <a:lstStyle/>
+          <a:p>
+            <a:pPr lvl="0"/>
+            <a:r>
+              <a:rPr lang="en-US" smtClean="0"/>
+              <a:t>Click to edit Master text styles</a:t>
+            </a:r>
+          </a:p>
+          <a:p>
+            <a:pPr lvl="1"/>
+            <a:r>
+              <a:rPr lang="en-US" smtClean="0"/>
+              <a:t>Second level</a:t>
+            </a:r>
+          </a:p>
+          <a:p>
+            <a:pPr lvl="2"/>
+            <a:r>
+              <a:rPr lang="en-US" smtClean="0"/>
+              <a:t>Third level</a:t>
+            </a:r>
+          </a:p>
+          <a:p>
+            <a:pPr lvl="3"/>
+            <a:r>
+              <a:rPr lang="en-US" smtClean="0"/>
+              <a:t>Fourth level</a:t>
+            </a:r>
+          </a:p>
+          <a:p>
+            <a:pPr lvl="4"/>
+            <a:r>
+              <a:rPr lang="en-US" smtClean="0"/>
+              <a:t>Fifth level</a:t>
+            </a:r>
+            <a:endParaRPr lang="en-US"/>
+          </a:p>
+        </p:txBody>
+      </p:sp>
+      <p:sp>
+        <p:nvSpPr>
+          <p:cNvPr id="6" name="Footer Placeholder 5"/>
+          <p:cNvSpPr>
+            <a:spLocks noGrp="1"/>
+          </p:cNvSpPr>
+          <p:nvPr>
+            <p:ph type="ftr" sz="quarter" idx="4"/>
+          </p:nvPr>
+        </p:nvSpPr>
+        <p:spPr>
+          <a:xfrm>
+            <a:off x="0" y="8685213"/>
+            <a:ext cx="2971800" cy="458787"/>
+          </a:xfrm>
+          <a:prstGeom prst="rect">
+            <a:avLst/>
+          </a:prstGeom>
+        </p:spPr>
+        <p:txBody>
+          <a:bodyPr vert="horz" lIns="91440" tIns="45720" rIns="91440" bIns="45720" rtlCol="0" anchor="b"/>
+          <a:lstStyle>
+            <a:lvl1pPr algn="l">
+              <a:defRPr sz="1200"/>
+            </a:lvl1pPr>
+          </a:lstStyle>
+          <a:p>
+            <a:endParaRPr lang="en-US"/>
+          </a:p>
+        </p:txBody>
+      </p:sp>
+      <p:sp>
+        <p:nvSpPr>
+          <p:cNvPr id="7" name="Slide Number Placeholder 6"/>
+          <p:cNvSpPr>
+            <a:spLocks noGrp="1"/>
+          </p:cNvSpPr>
+          <p:nvPr>
+            <p:ph type="sldNum" sz="quarter" idx="5"/>
+          </p:nvPr>
+        </p:nvSpPr>
+        <p:spPr>
+          <a:xfrm>
+            <a:off x="3884613" y="8685213"/>
+            <a:ext cx="2971800" cy="458787"/>
+          </a:xfrm>
+          <a:prstGeom prst="rect">
+            <a:avLst/>
+          </a:prstGeom>
+        </p:spPr>
+        <p:txBody>
+          <a:bodyPr vert="horz" lIns="91440" tIns="45720" rIns="91440" bIns="45720" rtlCol="0" anchor="b"/>
+          <a:lstStyle>
+            <a:lvl1pPr algn="r">
+              <a:defRPr sz="1200"/>
+            </a:lvl1pPr>
+          </a:lstStyle>
+          <a:p>
+            <a:fld id="{B2D13196-C59C-C24A-9058-A52F28E36E11}" type="slidenum">
+              <a:rPr lang="en-US" smtClean="0"/>
+              <a:t>‹#›</a:t>
+            </a:fld>
+            <a:endParaRPr lang="en-US"/>
+          </a:p>
+        </p:txBody>
+      </p:sp>
+    </p:spTree>
+    <p:extLst>
+      <p:ext uri="{BB962C8B-B14F-4D97-AF65-F5344CB8AC3E}">
+        <p14:creationId xmlns:p14="http://schemas.microsoft.com/office/powerpoint/2010/main" val="1512467878"/>
+      </p:ext>
+    </p:extLst>
+  </p:cSld>
+  <p:clrMap bg1="lt1" tx1="dk1" bg2="lt2" tx2="dk2" accent1="accent1" accent2="accent2" accent3="accent3" accent4="accent4" accent5="accent5" accent6="accent6" hlink="hlink" folHlink="folHlink"/>
+  <p:notesStyle>
+    <a:lvl1pPr marL="0" algn="l" defTabSz="914400" rtl="0" eaLnBrk="1" latinLnBrk="0" hangingPunct="1">
+      <a:defRPr sz="1200" kern="1200">
+        <a:solidFill>
+          <a:schemeClr val="tx1"/>
+        </a:solidFill>
+        <a:latin typeface="+mn-lt"/>
+        <a:ea typeface="+mn-ea"/>
+        <a:cs typeface="+mn-cs"/>
+      </a:defRPr>
+    </a:lvl1pPr>
+    <a:lvl2pPr marL="457200" algn="l" defTabSz="914400" rtl="0" eaLnBrk="1" latinLnBrk="0" hangingPunct="1">
+      <a:defRPr sz="1200" kern="1200">
+        <a:solidFill>
+          <a:schemeClr val="tx1"/>
+        </a:solidFill>
+        <a:latin typeface="+mn-lt"/>
+        <a:ea typeface="+mn-ea"/>
+        <a:cs typeface="+mn-cs"/>
+      </a:defRPr>
+    </a:lvl2pPr>
+    <a:lvl3pPr marL="914400" algn="l" defTabSz="914400" rtl="0" eaLnBrk="1" latinLnBrk="0" hangingPunct="1">
+      <a:defRPr sz="1200" kern="1200">
+        <a:solidFill>
+          <a:schemeClr val="tx1"/>
+        </a:solidFill>
+        <a:latin typeface="+mn-lt"/>
+        <a:ea typeface="+mn-ea"/>
+        <a:cs typeface="+mn-cs"/>
+      </a:defRPr>
+    </a:lvl3pPr>
+    <a:lvl4pPr marL="1371600" algn="l" defTabSz="914400" rtl="0" eaLnBrk="1" latinLnBrk="0" hangingPunct="1">
+      <a:defRPr sz="1200" kern="1200">
+        <a:solidFill>
+          <a:schemeClr val="tx1"/>
+        </a:solidFill>
+        <a:latin typeface="+mn-lt"/>
+        <a:ea typeface="+mn-ea"/>
+        <a:cs typeface="+mn-cs"/>
+      </a:defRPr>
+    </a:lvl4pPr>
+    <a:lvl5pPr marL="1828800" algn="l" defTabSz="914400" rtl="0" eaLnBrk="1" latinLnBrk="0" hangingPunct="1">
+      <a:defRPr sz="1200" kern="1200">
+        <a:solidFill>
+          <a:schemeClr val="tx1"/>
+        </a:solidFill>
+        <a:latin typeface="+mn-lt"/>
+        <a:ea typeface="+mn-ea"/>
+        <a:cs typeface="+mn-cs"/>
+      </a:defRPr>
+    </a:lvl5pPr>
+    <a:lvl6pPr marL="2286000" algn="l" defTabSz="914400" rtl="0" eaLnBrk="1" latinLnBrk="0" hangingPunct="1">
+      <a:defRPr sz="1200" kern="1200">
+        <a:solidFill>
+          <a:schemeClr val="tx1"/>
+        </a:solidFill>
+        <a:latin typeface="+mn-lt"/>
+        <a:ea typeface="+mn-ea"/>
+        <a:cs typeface="+mn-cs"/>
+      </a:defRPr>
+    </a:lvl6pPr>
+    <a:lvl7pPr marL="2743200" algn="l" defTabSz="914400" rtl="0" eaLnBrk="1" latinLnBrk="0" hangingPunct="1">
+      <a:defRPr sz="1200" kern="1200">
+        <a:solidFill>
+          <a:schemeClr val="tx1"/>
+        </a:solidFill>
+        <a:latin typeface="+mn-lt"/>
+        <a:ea typeface="+mn-ea"/>
+        <a:cs typeface="+mn-cs"/>
+      </a:defRPr>
+    </a:lvl7pPr>
+    <a:lvl8pPr marL="3200400" algn="l" defTabSz="914400" rtl="0" eaLnBrk="1" latinLnBrk="0" hangingPunct="1">
+      <a:defRPr sz="1200" kern="1200">
+        <a:solidFill>
+          <a:schemeClr val="tx1"/>
+        </a:solidFill>
+        <a:latin typeface="+mn-lt"/>
+        <a:ea typeface="+mn-ea"/>
+        <a:cs typeface="+mn-cs"/>
+      </a:defRPr>
+    </a:lvl8pPr>
+    <a:lvl9pPr marL="3657600" algn="l" defTabSz="914400" rtl="0" eaLnBrk="1" latinLnBrk="0" hangingPunct="1">
+      <a:defRPr sz="1200" kern="1200">
+        <a:solidFill>
+          <a:schemeClr val="tx1"/>
+        </a:solidFill>
+        <a:latin typeface="+mn-lt"/>
+        <a:ea typeface="+mn-ea"/>
+        <a:cs typeface="+mn-cs"/>
+      </a:defRPr>
+    </a:lvl9pPr>
+  </p:notesStyle>
+</p:notesMaster>
+</file>
+
 <file path=ppt/slideLayouts/slideLayout1.xml><?xml version="1.0" encoding="utf-8"?>
 <p:sldLayout xmlns:a="http://schemas.openxmlformats.org/drawingml/2006/main" xmlns:r="http://schemas.openxmlformats.org/officeDocument/2006/relationships" xmlns:p="http://schemas.openxmlformats.org/presentationml/2006/main" preserve="1">
   <p:cSld name="Заглавен слайд">
@@ -1681,7 +2034,7 @@
           <p:cNvPr id="2" name="Заглавие 1">
             <a:extLst>
               <a:ext uri="{FF2B5EF4-FFF2-40B4-BE49-F238E27FC236}">
-                <a16:creationId xmlns:a16="http://schemas.microsoft.com/office/drawing/2014/main" id="{B22BCD4A-FF19-4C5A-813F-6B7C9AF323AB}"/>
+                <a16:creationId xmlns:a16="http://schemas.microsoft.com/office/drawing/2014/main" xmlns="" id="{B22BCD4A-FF19-4C5A-813F-6B7C9AF323AB}"/>
               </a:ext>
             </a:extLst>
           </p:cNvPr>
@@ -1719,7 +2072,7 @@
           <p:cNvPr id="3" name="Подзаглавие 2">
             <a:extLst>
               <a:ext uri="{FF2B5EF4-FFF2-40B4-BE49-F238E27FC236}">
-                <a16:creationId xmlns:a16="http://schemas.microsoft.com/office/drawing/2014/main" id="{62894606-E36F-4F8B-98A2-06EF224F7B29}"/>
+                <a16:creationId xmlns:a16="http://schemas.microsoft.com/office/drawing/2014/main" xmlns="" id="{62894606-E36F-4F8B-98A2-06EF224F7B29}"/>
               </a:ext>
             </a:extLst>
           </p:cNvPr>
@@ -1790,7 +2143,7 @@
           <p:cNvPr id="4" name="Контейнер за дата 3">
             <a:extLst>
               <a:ext uri="{FF2B5EF4-FFF2-40B4-BE49-F238E27FC236}">
-                <a16:creationId xmlns:a16="http://schemas.microsoft.com/office/drawing/2014/main" id="{D6BE3A7E-B315-42C1-9046-436867EF181C}"/>
+                <a16:creationId xmlns:a16="http://schemas.microsoft.com/office/drawing/2014/main" xmlns="" id="{D6BE3A7E-B315-42C1-9046-436867EF181C}"/>
               </a:ext>
             </a:extLst>
           </p:cNvPr>
@@ -1808,7 +2161,7 @@
           <a:p>
             <a:fld id="{B25F73C5-2D0A-4B8B-8297-535EC6C0052D}" type="datetimeFigureOut">
               <a:rPr lang="en-US" smtClean="0"/>
-              <a:t>10/16/2017</a:t>
+              <a:t>10/18/17</a:t>
             </a:fld>
             <a:endParaRPr lang="en-US"/>
           </a:p>
@@ -1819,7 +2172,7 @@
           <p:cNvPr id="5" name="Контейнер за долния колонтитул 4">
             <a:extLst>
               <a:ext uri="{FF2B5EF4-FFF2-40B4-BE49-F238E27FC236}">
-                <a16:creationId xmlns:a16="http://schemas.microsoft.com/office/drawing/2014/main" id="{8A530FAC-6D7C-4D79-A0AA-91B33CE4BF9B}"/>
+                <a16:creationId xmlns:a16="http://schemas.microsoft.com/office/drawing/2014/main" xmlns="" id="{8A530FAC-6D7C-4D79-A0AA-91B33CE4BF9B}"/>
               </a:ext>
             </a:extLst>
           </p:cNvPr>
@@ -1844,7 +2197,7 @@
           <p:cNvPr id="6" name="Контейнер за номер на слайда 5">
             <a:extLst>
               <a:ext uri="{FF2B5EF4-FFF2-40B4-BE49-F238E27FC236}">
-                <a16:creationId xmlns:a16="http://schemas.microsoft.com/office/drawing/2014/main" id="{7F513F0A-AC64-4EE8-B62A-E5164EF5AA21}"/>
+                <a16:creationId xmlns:a16="http://schemas.microsoft.com/office/drawing/2014/main" xmlns="" id="{7F513F0A-AC64-4EE8-B62A-E5164EF5AA21}"/>
               </a:ext>
             </a:extLst>
           </p:cNvPr>
@@ -2384,7 +2737,7 @@
           <p:cNvPr id="4" name="Заглавие 3">
             <a:extLst>
               <a:ext uri="{FF2B5EF4-FFF2-40B4-BE49-F238E27FC236}">
-                <a16:creationId xmlns:a16="http://schemas.microsoft.com/office/drawing/2014/main" id="{88E45B10-849E-4E3D-AEA7-29E863482F63}"/>
+                <a16:creationId xmlns:a16="http://schemas.microsoft.com/office/drawing/2014/main" xmlns="" id="{88E45B10-849E-4E3D-AEA7-29E863482F63}"/>
               </a:ext>
             </a:extLst>
           </p:cNvPr>
@@ -2421,7 +2774,7 @@
           <p:cNvPr id="5" name="Подзаглавие 4">
             <a:extLst>
               <a:ext uri="{FF2B5EF4-FFF2-40B4-BE49-F238E27FC236}">
-                <a16:creationId xmlns:a16="http://schemas.microsoft.com/office/drawing/2014/main" id="{FDD3ADC9-3785-4EE1-B315-C2F1D95E3234}"/>
+                <a16:creationId xmlns:a16="http://schemas.microsoft.com/office/drawing/2014/main" xmlns="" id="{FDD3ADC9-3785-4EE1-B315-C2F1D95E3234}"/>
               </a:ext>
             </a:extLst>
           </p:cNvPr>
@@ -2464,7 +2817,7 @@
           <p:cNvPr id="6" name="Текстов контейнер 5">
             <a:extLst>
               <a:ext uri="{FF2B5EF4-FFF2-40B4-BE49-F238E27FC236}">
-                <a16:creationId xmlns:a16="http://schemas.microsoft.com/office/drawing/2014/main" id="{8837421D-8977-4F5F-A1C7-58B750A98B82}"/>
+                <a16:creationId xmlns:a16="http://schemas.microsoft.com/office/drawing/2014/main" xmlns="" id="{8837421D-8977-4F5F-A1C7-58B750A98B82}"/>
               </a:ext>
             </a:extLst>
           </p:cNvPr>
@@ -2502,6 +2855,13 @@
   <p:clrMapOvr>
     <a:masterClrMapping/>
   </p:clrMapOvr>
+  <p:timing>
+    <p:tnLst>
+      <p:par>
+        <p:cTn id="1" dur="indefinite" restart="never" nodeType="tmRoot"/>
+      </p:par>
+    </p:tnLst>
+  </p:timing>
 </p:sld>
 </file>
 
@@ -2524,10 +2884,10 @@
       </p:grpSpPr>
       <p:sp>
         <p:nvSpPr>
-          <p:cNvPr id="2" name="Контейнер за съдържание 1">
+          <p:cNvPr id="4" name="Контейнер за съдържание 3">
             <a:extLst>
               <a:ext uri="{FF2B5EF4-FFF2-40B4-BE49-F238E27FC236}">
-                <a16:creationId xmlns:a16="http://schemas.microsoft.com/office/drawing/2014/main" id="{A61C3C34-1DC4-4F45-AFF2-7B748CC1B821}"/>
+                <a16:creationId xmlns:a16="http://schemas.microsoft.com/office/drawing/2014/main" xmlns="" id="{755B6AB4-2083-42DF-A66E-2DEF8C1844F3}"/>
               </a:ext>
             </a:extLst>
           </p:cNvPr>
@@ -2538,21 +2898,462 @@
             <p:ph sz="quarter" idx="13"/>
           </p:nvPr>
         </p:nvSpPr>
-        <p:spPr/>
+        <p:spPr>
+          <a:xfrm>
+            <a:off x="438152" y="1486893"/>
+            <a:ext cx="4425948" cy="4763435"/>
+          </a:xfrm>
+        </p:spPr>
         <p:txBody>
-          <a:bodyPr/>
+          <a:bodyPr>
+            <a:normAutofit/>
+          </a:bodyPr>
           <a:lstStyle/>
           <a:p>
-            <a:endParaRPr lang="en-US" dirty="0"/>
+            <a:pPr marL="0" indent="0">
+              <a:lnSpc>
+                <a:spcPct val="110000"/>
+              </a:lnSpc>
+              <a:buNone/>
+            </a:pPr>
+            <a:r>
+              <a:rPr lang="en-US" sz="1700" b="1" dirty="0" smtClean="0">
+                <a:solidFill>
+                  <a:srgbClr val="008F00"/>
+                </a:solidFill>
+                <a:latin typeface="Courier" charset="0"/>
+              </a:rPr>
+              <a:t>public</a:t>
+            </a:r>
+            <a:r>
+              <a:rPr lang="en-US" sz="1700" dirty="0" smtClean="0">
+                <a:latin typeface="Courier" charset="0"/>
+              </a:rPr>
+              <a:t> </a:t>
+            </a:r>
+            <a:r>
+              <a:rPr lang="en-US" sz="1700" dirty="0">
+                <a:latin typeface="Courier" charset="0"/>
+              </a:rPr>
+              <a:t>Observable</a:t>
+            </a:r>
+            <a:r>
+              <a:rPr lang="en-US" sz="1700" dirty="0">
+                <a:solidFill>
+                  <a:srgbClr val="797979"/>
+                </a:solidFill>
+                <a:latin typeface="Courier" charset="0"/>
+              </a:rPr>
+              <a:t>&lt;</a:t>
+            </a:r>
+            <a:r>
+              <a:rPr lang="en-US" sz="1700" dirty="0">
+                <a:latin typeface="Courier" charset="0"/>
+              </a:rPr>
+              <a:t>String</a:t>
+            </a:r>
+            <a:r>
+              <a:rPr lang="en-US" sz="1700" dirty="0">
+                <a:solidFill>
+                  <a:srgbClr val="797979"/>
+                </a:solidFill>
+                <a:latin typeface="Courier" charset="0"/>
+              </a:rPr>
+              <a:t>&gt;</a:t>
+            </a:r>
+            <a:r>
+              <a:rPr lang="en-US" sz="1700" dirty="0">
+                <a:latin typeface="Courier" charset="0"/>
+              </a:rPr>
+              <a:t> </a:t>
+            </a:r>
+            <a:r>
+              <a:rPr lang="en-US" sz="1700" dirty="0" smtClean="0">
+                <a:solidFill>
+                  <a:srgbClr val="0433FF"/>
+                </a:solidFill>
+                <a:latin typeface="Courier" charset="0"/>
+              </a:rPr>
+              <a:t>get</a:t>
+            </a:r>
+            <a:r>
+              <a:rPr lang="en-US" sz="1700" dirty="0" smtClean="0">
+                <a:solidFill>
+                  <a:srgbClr val="797979"/>
+                </a:solidFill>
+                <a:latin typeface="Courier" charset="0"/>
+              </a:rPr>
+              <a:t>(</a:t>
+            </a:r>
+          </a:p>
+          <a:p>
+            <a:pPr marL="0" indent="0">
+              <a:lnSpc>
+                <a:spcPct val="110000"/>
+              </a:lnSpc>
+              <a:buNone/>
+            </a:pPr>
+            <a:r>
+              <a:rPr lang="en-US" sz="1700" b="1" dirty="0">
+                <a:solidFill>
+                  <a:srgbClr val="797979"/>
+                </a:solidFill>
+                <a:latin typeface="Courier" charset="0"/>
+              </a:rPr>
+              <a:t> </a:t>
+            </a:r>
+            <a:r>
+              <a:rPr lang="en-US" sz="1700" b="1" dirty="0" smtClean="0">
+                <a:solidFill>
+                  <a:srgbClr val="797979"/>
+                </a:solidFill>
+                <a:latin typeface="Courier" charset="0"/>
+              </a:rPr>
+              <a:t>  </a:t>
+            </a:r>
+            <a:r>
+              <a:rPr lang="en-US" sz="1700" b="1" dirty="0" smtClean="0">
+                <a:solidFill>
+                  <a:srgbClr val="008F00"/>
+                </a:solidFill>
+                <a:latin typeface="Courier" charset="0"/>
+              </a:rPr>
+              <a:t>final</a:t>
+            </a:r>
+            <a:r>
+              <a:rPr lang="en-US" sz="1700" dirty="0" smtClean="0">
+                <a:latin typeface="Courier" charset="0"/>
+              </a:rPr>
+              <a:t> </a:t>
+            </a:r>
+            <a:r>
+              <a:rPr lang="en-US" sz="1700" dirty="0">
+                <a:latin typeface="Courier" charset="0"/>
+              </a:rPr>
+              <a:t>String </a:t>
+            </a:r>
+            <a:r>
+              <a:rPr lang="en-US" sz="1700" dirty="0" err="1">
+                <a:latin typeface="Courier" charset="0"/>
+              </a:rPr>
+              <a:t>url</a:t>
+            </a:r>
+            <a:r>
+              <a:rPr lang="en-US" sz="1700" dirty="0">
+                <a:solidFill>
+                  <a:srgbClr val="797979"/>
+                </a:solidFill>
+                <a:latin typeface="Courier" charset="0"/>
+              </a:rPr>
+              <a:t>)</a:t>
+            </a:r>
+            <a:r>
+              <a:rPr lang="en-US" sz="1700" dirty="0">
+                <a:latin typeface="Courier" charset="0"/>
+              </a:rPr>
+              <a:t> </a:t>
+            </a:r>
+            <a:r>
+              <a:rPr lang="en-US" sz="1700" dirty="0">
+                <a:solidFill>
+                  <a:srgbClr val="797979"/>
+                </a:solidFill>
+                <a:latin typeface="Courier" charset="0"/>
+              </a:rPr>
+              <a:t>{</a:t>
+            </a:r>
+            <a:endParaRPr lang="en-US" sz="1700" dirty="0">
+              <a:latin typeface="Courier" charset="0"/>
+            </a:endParaRPr>
+          </a:p>
+          <a:p>
+            <a:pPr marL="0" indent="0">
+              <a:lnSpc>
+                <a:spcPct val="110000"/>
+              </a:lnSpc>
+              <a:buNone/>
+            </a:pPr>
+            <a:r>
+              <a:rPr lang="en-US" sz="1700" dirty="0">
+                <a:latin typeface="Courier" charset="0"/>
+              </a:rPr>
+              <a:t>     </a:t>
+            </a:r>
+            <a:r>
+              <a:rPr lang="en-US" sz="1700" b="1" dirty="0" smtClean="0">
+                <a:solidFill>
+                  <a:srgbClr val="008F00"/>
+                </a:solidFill>
+                <a:latin typeface="Courier" charset="0"/>
+              </a:rPr>
+              <a:t>return</a:t>
+            </a:r>
+            <a:r>
+              <a:rPr lang="en-US" sz="1700" dirty="0" smtClean="0">
+                <a:latin typeface="Courier" charset="0"/>
+              </a:rPr>
+              <a:t> </a:t>
+            </a:r>
+            <a:r>
+              <a:rPr lang="en-US" sz="1700" dirty="0" err="1" smtClean="0">
+                <a:latin typeface="Courier" charset="0"/>
+              </a:rPr>
+              <a:t>Observable</a:t>
+            </a:r>
+            <a:r>
+              <a:rPr lang="en-US" sz="1700" dirty="0" err="1" smtClean="0">
+                <a:solidFill>
+                  <a:srgbClr val="797979"/>
+                </a:solidFill>
+                <a:latin typeface="Courier" charset="0"/>
+              </a:rPr>
+              <a:t>.</a:t>
+            </a:r>
+            <a:r>
+              <a:rPr lang="en-US" sz="1700" dirty="0" err="1" smtClean="0">
+                <a:solidFill>
+                  <a:srgbClr val="8F9F36"/>
+                </a:solidFill>
+                <a:latin typeface="Courier" charset="0"/>
+              </a:rPr>
+              <a:t>create</a:t>
+            </a:r>
+            <a:r>
+              <a:rPr lang="en-US" sz="1700" dirty="0" smtClean="0">
+                <a:solidFill>
+                  <a:srgbClr val="797979"/>
+                </a:solidFill>
+                <a:latin typeface="Courier" charset="0"/>
+              </a:rPr>
+              <a:t>(</a:t>
+            </a:r>
+          </a:p>
+          <a:p>
+            <a:pPr marL="0" indent="0">
+              <a:lnSpc>
+                <a:spcPct val="110000"/>
+              </a:lnSpc>
+              <a:buNone/>
+            </a:pPr>
+            <a:r>
+              <a:rPr lang="en-US" sz="1700" dirty="0">
+                <a:solidFill>
+                  <a:srgbClr val="797979"/>
+                </a:solidFill>
+                <a:latin typeface="Courier" charset="0"/>
+              </a:rPr>
+              <a:t> </a:t>
+            </a:r>
+            <a:r>
+              <a:rPr lang="en-US" sz="1700" dirty="0" smtClean="0">
+                <a:solidFill>
+                  <a:srgbClr val="797979"/>
+                </a:solidFill>
+                <a:latin typeface="Courier" charset="0"/>
+              </a:rPr>
+              <a:t>      </a:t>
+            </a:r>
+            <a:r>
+              <a:rPr lang="en-US" sz="1700" dirty="0" smtClean="0">
+                <a:latin typeface="Courier" charset="0"/>
+              </a:rPr>
+              <a:t>e -&gt;</a:t>
+            </a:r>
+          </a:p>
+          <a:p>
+            <a:pPr marL="0" indent="0">
+              <a:lnSpc>
+                <a:spcPct val="110000"/>
+              </a:lnSpc>
+              <a:buNone/>
+            </a:pPr>
+            <a:r>
+              <a:rPr lang="is-IS" sz="1700" dirty="0" smtClean="0">
+                <a:latin typeface="Courier" charset="0"/>
+              </a:rPr>
+              <a:t>          // get string body</a:t>
+            </a:r>
+          </a:p>
+          <a:p>
+            <a:pPr marL="0" indent="0">
+              <a:lnSpc>
+                <a:spcPct val="110000"/>
+              </a:lnSpc>
+              <a:buNone/>
+            </a:pPr>
+            <a:r>
+              <a:rPr lang="is-IS" sz="1700" dirty="0">
+                <a:latin typeface="Courier" charset="0"/>
+              </a:rPr>
+              <a:t>       </a:t>
+            </a:r>
+            <a:r>
+              <a:rPr lang="is-IS" sz="1700" dirty="0" smtClean="0">
+                <a:latin typeface="Courier" charset="0"/>
+              </a:rPr>
+              <a:t>   e</a:t>
+            </a:r>
+            <a:r>
+              <a:rPr lang="is-IS" sz="1700" dirty="0" smtClean="0">
+                <a:solidFill>
+                  <a:srgbClr val="797979"/>
+                </a:solidFill>
+                <a:latin typeface="Courier" charset="0"/>
+              </a:rPr>
+              <a:t>.</a:t>
+            </a:r>
+            <a:r>
+              <a:rPr lang="is-IS" sz="1700" dirty="0" smtClean="0">
+                <a:solidFill>
+                  <a:srgbClr val="8F9F36"/>
+                </a:solidFill>
+                <a:latin typeface="Courier" charset="0"/>
+              </a:rPr>
+              <a:t>onNext</a:t>
+            </a:r>
+            <a:r>
+              <a:rPr lang="is-IS" sz="1700" dirty="0" smtClean="0">
+                <a:solidFill>
+                  <a:srgbClr val="797979"/>
+                </a:solidFill>
+                <a:latin typeface="Courier" charset="0"/>
+              </a:rPr>
+              <a:t>(</a:t>
+            </a:r>
+            <a:r>
+              <a:rPr lang="is-IS" sz="1700" dirty="0" smtClean="0">
+                <a:latin typeface="Courier" charset="0"/>
+              </a:rPr>
+              <a:t>body</a:t>
+            </a:r>
+            <a:r>
+              <a:rPr lang="is-IS" sz="1700" dirty="0" smtClean="0">
+                <a:solidFill>
+                  <a:srgbClr val="797979"/>
+                </a:solidFill>
+                <a:latin typeface="Courier" charset="0"/>
+              </a:rPr>
+              <a:t>);</a:t>
+            </a:r>
+          </a:p>
+          <a:p>
+            <a:pPr marL="0" indent="0">
+              <a:lnSpc>
+                <a:spcPct val="110000"/>
+              </a:lnSpc>
+              <a:buNone/>
+            </a:pPr>
+            <a:r>
+              <a:rPr lang="is-IS" sz="1700" dirty="0">
+                <a:latin typeface="Courier" charset="0"/>
+              </a:rPr>
+              <a:t>       </a:t>
+            </a:r>
+            <a:r>
+              <a:rPr lang="is-IS" sz="1700" dirty="0" smtClean="0">
+                <a:latin typeface="Courier" charset="0"/>
+              </a:rPr>
+              <a:t>   e</a:t>
+            </a:r>
+            <a:r>
+              <a:rPr lang="is-IS" sz="1700" dirty="0" smtClean="0">
+                <a:solidFill>
+                  <a:srgbClr val="797979"/>
+                </a:solidFill>
+                <a:latin typeface="Courier" charset="0"/>
+              </a:rPr>
+              <a:t>.</a:t>
+            </a:r>
+            <a:r>
+              <a:rPr lang="is-IS" sz="1700" dirty="0" smtClean="0">
+                <a:solidFill>
+                  <a:srgbClr val="8F9F36"/>
+                </a:solidFill>
+                <a:latin typeface="Courier" charset="0"/>
+              </a:rPr>
+              <a:t>onComplete</a:t>
+            </a:r>
+            <a:r>
+              <a:rPr lang="is-IS" sz="1700" dirty="0" smtClean="0">
+                <a:solidFill>
+                  <a:srgbClr val="797979"/>
+                </a:solidFill>
+                <a:latin typeface="Courier" charset="0"/>
+              </a:rPr>
+              <a:t>();</a:t>
+            </a:r>
+            <a:endParaRPr lang="is-IS" sz="1700" dirty="0" smtClean="0">
+              <a:latin typeface="Courier" charset="0"/>
+            </a:endParaRPr>
+          </a:p>
+          <a:p>
+            <a:pPr marL="0" indent="0">
+              <a:lnSpc>
+                <a:spcPct val="110000"/>
+              </a:lnSpc>
+              <a:buNone/>
+            </a:pPr>
+            <a:r>
+              <a:rPr lang="en-US" sz="1700" dirty="0" smtClean="0">
+                <a:latin typeface="Courier" charset="0"/>
+              </a:rPr>
+              <a:t>    </a:t>
+            </a:r>
+            <a:r>
+              <a:rPr lang="en-US" sz="1700" dirty="0" smtClean="0">
+                <a:solidFill>
+                  <a:srgbClr val="797979"/>
+                </a:solidFill>
+                <a:latin typeface="Courier" charset="0"/>
+              </a:rPr>
+              <a:t>});</a:t>
+            </a:r>
+            <a:endParaRPr lang="en-US" sz="1700" dirty="0">
+              <a:latin typeface="Courier" charset="0"/>
+            </a:endParaRPr>
+          </a:p>
+          <a:p>
+            <a:pPr marL="0" indent="0">
+              <a:lnSpc>
+                <a:spcPct val="110000"/>
+              </a:lnSpc>
+              <a:buNone/>
+            </a:pPr>
+            <a:r>
+              <a:rPr lang="en-US" sz="1700" dirty="0" smtClean="0">
+                <a:solidFill>
+                  <a:srgbClr val="797979"/>
+                </a:solidFill>
+                <a:latin typeface="Courier" charset="0"/>
+              </a:rPr>
+              <a:t>}</a:t>
+            </a:r>
+            <a:endParaRPr lang="en-US" sz="1700" dirty="0">
+              <a:latin typeface="Courier" charset="0"/>
+            </a:endParaRPr>
+          </a:p>
+          <a:p>
+            <a:pPr marL="0" indent="0" defTabSz="914400">
+              <a:lnSpc>
+                <a:spcPct val="110000"/>
+              </a:lnSpc>
+              <a:spcBef>
+                <a:spcPts val="0"/>
+              </a:spcBef>
+              <a:buClrTx/>
+              <a:buSzTx/>
+              <a:buNone/>
+            </a:pPr>
+            <a:endParaRPr lang="en-US" sz="1700" dirty="0"/>
           </a:p>
         </p:txBody>
       </p:sp>
       <p:sp>
         <p:nvSpPr>
-          <p:cNvPr id="3" name="Заглавие 2">
+          <p:cNvPr id="2" name="Заглавие 1">
             <a:extLst>
               <a:ext uri="{FF2B5EF4-FFF2-40B4-BE49-F238E27FC236}">
-                <a16:creationId xmlns:a16="http://schemas.microsoft.com/office/drawing/2014/main" id="{70C687DA-8D06-4A5C-A039-7363D9F593D3}"/>
+                <a16:creationId xmlns:a16="http://schemas.microsoft.com/office/drawing/2014/main" xmlns="" id="{123DB5C9-6192-487A-A9A3-C51F05950985}"/>
               </a:ext>
             </a:extLst>
           </p:cNvPr>
@@ -2570,11 +3371,11 @@
           <a:p>
             <a:r>
               <a:rPr lang="en-US" dirty="0"/>
-              <a:t>Making Http Requests with </a:t>
-            </a:r>
-            <a:r>
-              <a:rPr lang="en-US" dirty="0" err="1"/>
-              <a:t>ReactiveX</a:t>
+              <a:t>Demo: </a:t>
+            </a:r>
+            <a:r>
+              <a:rPr lang="en-US" dirty="0" smtClean="0"/>
+              <a:t>Handling HTTP requests made easy</a:t>
             </a:r>
             <a:endParaRPr lang="en-US" dirty="0"/>
           </a:p>
@@ -2582,10 +3383,10 @@
       </p:sp>
       <p:sp>
         <p:nvSpPr>
-          <p:cNvPr id="4" name="Контейнер за съдържание 3">
+          <p:cNvPr id="5" name="Контейнер за съдържание 4">
             <a:extLst>
               <a:ext uri="{FF2B5EF4-FFF2-40B4-BE49-F238E27FC236}">
-                <a16:creationId xmlns:a16="http://schemas.microsoft.com/office/drawing/2014/main" id="{59D38E7F-6E3C-4C03-99B7-513E0F0D0DAB}"/>
+                <a16:creationId xmlns:a16="http://schemas.microsoft.com/office/drawing/2014/main" xmlns="" id="{0070CB68-2442-4FA5-87A3-6A8C83E92630}"/>
               </a:ext>
             </a:extLst>
           </p:cNvPr>
@@ -2596,25 +3397,530 @@
             <p:ph sz="quarter" idx="14"/>
           </p:nvPr>
         </p:nvSpPr>
-        <p:spPr/>
+        <p:spPr>
+          <a:xfrm>
+            <a:off x="5270500" y="1486894"/>
+            <a:ext cx="6506213" cy="4763434"/>
+          </a:xfrm>
+        </p:spPr>
         <p:txBody>
-          <a:bodyPr/>
+          <a:bodyPr>
+            <a:normAutofit/>
+          </a:bodyPr>
           <a:lstStyle/>
           <a:p>
-            <a:endParaRPr lang="en-US"/>
+            <a:pPr marL="0" indent="0">
+              <a:lnSpc>
+                <a:spcPct val="100000"/>
+              </a:lnSpc>
+              <a:buNone/>
+            </a:pPr>
+            <a:r>
+              <a:rPr lang="is-IS" sz="1700" b="1" dirty="0">
+                <a:solidFill>
+                  <a:srgbClr val="008F00"/>
+                </a:solidFill>
+                <a:latin typeface="Courier" charset="0"/>
+              </a:rPr>
+              <a:t>private</a:t>
+            </a:r>
+            <a:r>
+              <a:rPr lang="is-IS" sz="1700" dirty="0">
+                <a:solidFill>
+                  <a:srgbClr val="000000"/>
+                </a:solidFill>
+                <a:latin typeface="Courier" charset="0"/>
+              </a:rPr>
+              <a:t> </a:t>
+            </a:r>
+            <a:r>
+              <a:rPr lang="is-IS" sz="1700" dirty="0">
+                <a:solidFill>
+                  <a:srgbClr val="C01E51"/>
+                </a:solidFill>
+                <a:latin typeface="Courier" charset="0"/>
+              </a:rPr>
+              <a:t>void</a:t>
+            </a:r>
+            <a:r>
+              <a:rPr lang="is-IS" sz="1700" dirty="0">
+                <a:solidFill>
+                  <a:srgbClr val="000000"/>
+                </a:solidFill>
+                <a:latin typeface="Courier" charset="0"/>
+              </a:rPr>
+              <a:t> </a:t>
+            </a:r>
+            <a:r>
+              <a:rPr lang="is-IS" sz="1700" dirty="0">
+                <a:solidFill>
+                  <a:srgbClr val="0433FF"/>
+                </a:solidFill>
+                <a:latin typeface="Courier" charset="0"/>
+              </a:rPr>
+              <a:t>load</a:t>
+            </a:r>
+            <a:r>
+              <a:rPr lang="is-IS" sz="1700" dirty="0">
+                <a:solidFill>
+                  <a:srgbClr val="797979"/>
+                </a:solidFill>
+                <a:latin typeface="Courier" charset="0"/>
+              </a:rPr>
+              <a:t>()</a:t>
+            </a:r>
+            <a:r>
+              <a:rPr lang="is-IS" sz="1700" dirty="0">
+                <a:solidFill>
+                  <a:srgbClr val="000000"/>
+                </a:solidFill>
+                <a:latin typeface="Courier" charset="0"/>
+              </a:rPr>
+              <a:t> </a:t>
+            </a:r>
+            <a:r>
+              <a:rPr lang="is-IS" sz="1700" dirty="0" smtClean="0">
+                <a:solidFill>
+                  <a:srgbClr val="797979"/>
+                </a:solidFill>
+                <a:latin typeface="Courier" charset="0"/>
+              </a:rPr>
+              <a:t>{</a:t>
+            </a:r>
+            <a:endParaRPr lang="is-IS" sz="1700" dirty="0">
+              <a:solidFill>
+                <a:srgbClr val="008F00"/>
+              </a:solidFill>
+              <a:latin typeface="Courier" charset="0"/>
+            </a:endParaRPr>
+          </a:p>
+          <a:p>
+            <a:pPr marL="0" indent="0">
+              <a:buNone/>
+            </a:pPr>
+            <a:r>
+              <a:rPr lang="en-US" sz="1700" dirty="0" smtClean="0">
+                <a:latin typeface="Courier" charset="0"/>
+              </a:rPr>
+              <a:t>    </a:t>
+            </a:r>
+            <a:r>
+              <a:rPr lang="en-US" sz="1700" dirty="0" err="1" smtClean="0">
+                <a:latin typeface="Courier" charset="0"/>
+              </a:rPr>
+              <a:t>http</a:t>
+            </a:r>
+            <a:r>
+              <a:rPr lang="en-US" sz="1700" dirty="0" err="1" smtClean="0">
+                <a:solidFill>
+                  <a:srgbClr val="797979"/>
+                </a:solidFill>
+                <a:latin typeface="Courier" charset="0"/>
+              </a:rPr>
+              <a:t>.</a:t>
+            </a:r>
+            <a:r>
+              <a:rPr lang="en-US" sz="1700" dirty="0" err="1" smtClean="0">
+                <a:solidFill>
+                  <a:srgbClr val="8F9F36"/>
+                </a:solidFill>
+                <a:latin typeface="Courier" charset="0"/>
+              </a:rPr>
+              <a:t>post</a:t>
+            </a:r>
+            <a:r>
+              <a:rPr lang="en-US" sz="1700" dirty="0" smtClean="0">
+                <a:solidFill>
+                  <a:srgbClr val="797979"/>
+                </a:solidFill>
+                <a:latin typeface="Courier" charset="0"/>
+              </a:rPr>
+              <a:t>(</a:t>
+            </a:r>
+            <a:r>
+              <a:rPr lang="en-US" sz="1700" dirty="0" smtClean="0">
+                <a:latin typeface="Courier" charset="0"/>
+              </a:rPr>
+              <a:t>URL</a:t>
+            </a:r>
+            <a:r>
+              <a:rPr lang="en-US" sz="1700" dirty="0">
+                <a:solidFill>
+                  <a:srgbClr val="797979"/>
+                </a:solidFill>
+                <a:latin typeface="Courier" charset="0"/>
+              </a:rPr>
+              <a:t>,</a:t>
+            </a:r>
+            <a:r>
+              <a:rPr lang="en-US" sz="1700" dirty="0">
+                <a:latin typeface="Courier" charset="0"/>
+              </a:rPr>
+              <a:t> body</a:t>
+            </a:r>
+            <a:r>
+              <a:rPr lang="en-US" sz="1700" dirty="0">
+                <a:solidFill>
+                  <a:srgbClr val="797979"/>
+                </a:solidFill>
+                <a:latin typeface="Courier" charset="0"/>
+              </a:rPr>
+              <a:t>)</a:t>
+            </a:r>
+            <a:endParaRPr lang="en-US" sz="1700" dirty="0">
+              <a:latin typeface="Courier" charset="0"/>
+            </a:endParaRPr>
+          </a:p>
+          <a:p>
+            <a:pPr marL="0" indent="0">
+              <a:buNone/>
+            </a:pPr>
+            <a:r>
+              <a:rPr lang="en-US" sz="1700" dirty="0">
+                <a:latin typeface="Courier" charset="0"/>
+              </a:rPr>
+              <a:t>     </a:t>
+            </a:r>
+            <a:r>
+              <a:rPr lang="en-US" sz="1700" dirty="0" smtClean="0">
+                <a:solidFill>
+                  <a:srgbClr val="797979"/>
+                </a:solidFill>
+                <a:latin typeface="Courier" charset="0"/>
+              </a:rPr>
+              <a:t>.</a:t>
+            </a:r>
+            <a:r>
+              <a:rPr lang="en-US" sz="1700" dirty="0" err="1">
+                <a:solidFill>
+                  <a:srgbClr val="8F9F36"/>
+                </a:solidFill>
+                <a:latin typeface="Courier" charset="0"/>
+              </a:rPr>
+              <a:t>switchMap</a:t>
+            </a:r>
+            <a:r>
+              <a:rPr lang="en-US" sz="1700" dirty="0">
+                <a:solidFill>
+                  <a:srgbClr val="797979"/>
+                </a:solidFill>
+                <a:latin typeface="Courier" charset="0"/>
+              </a:rPr>
+              <a:t>(</a:t>
+            </a:r>
+            <a:r>
+              <a:rPr lang="en-US" sz="1700" dirty="0">
+                <a:latin typeface="Courier" charset="0"/>
+              </a:rPr>
+              <a:t>result </a:t>
+            </a:r>
+            <a:r>
+              <a:rPr lang="en-US" sz="1700" dirty="0">
+                <a:solidFill>
+                  <a:srgbClr val="797979"/>
+                </a:solidFill>
+                <a:latin typeface="Courier" charset="0"/>
+              </a:rPr>
+              <a:t>-&gt;</a:t>
+            </a:r>
+            <a:r>
+              <a:rPr lang="en-US" sz="1700" dirty="0">
+                <a:latin typeface="Courier" charset="0"/>
+              </a:rPr>
+              <a:t> </a:t>
+            </a:r>
+            <a:r>
+              <a:rPr lang="en-US" sz="1700" dirty="0" err="1" smtClean="0">
+                <a:latin typeface="Courier" charset="0"/>
+              </a:rPr>
+              <a:t>http</a:t>
+            </a:r>
+            <a:r>
+              <a:rPr lang="en-US" sz="1700" dirty="0" err="1" smtClean="0">
+                <a:solidFill>
+                  <a:srgbClr val="797979"/>
+                </a:solidFill>
+                <a:latin typeface="Courier" charset="0"/>
+              </a:rPr>
+              <a:t>.</a:t>
+            </a:r>
+            <a:r>
+              <a:rPr lang="en-US" sz="1700" dirty="0" err="1" smtClean="0">
+                <a:solidFill>
+                  <a:srgbClr val="8F9F36"/>
+                </a:solidFill>
+                <a:latin typeface="Courier" charset="0"/>
+              </a:rPr>
+              <a:t>get</a:t>
+            </a:r>
+            <a:r>
+              <a:rPr lang="en-US" sz="1700" dirty="0" smtClean="0">
+                <a:solidFill>
+                  <a:srgbClr val="797979"/>
+                </a:solidFill>
+                <a:latin typeface="Courier" charset="0"/>
+              </a:rPr>
+              <a:t>(</a:t>
+            </a:r>
+            <a:r>
+              <a:rPr lang="en-US" sz="1700" dirty="0" smtClean="0">
+                <a:latin typeface="Courier" charset="0"/>
+              </a:rPr>
+              <a:t>URL</a:t>
+            </a:r>
+            <a:r>
+              <a:rPr lang="en-US" sz="1700" dirty="0">
+                <a:solidFill>
+                  <a:srgbClr val="797979"/>
+                </a:solidFill>
+                <a:latin typeface="Courier" charset="0"/>
+              </a:rPr>
+              <a:t>))</a:t>
+            </a:r>
+            <a:endParaRPr lang="en-US" sz="1700" dirty="0">
+              <a:latin typeface="Courier" charset="0"/>
+            </a:endParaRPr>
+          </a:p>
+          <a:p>
+            <a:pPr marL="0" indent="0">
+              <a:buNone/>
+            </a:pPr>
+            <a:r>
+              <a:rPr lang="en-US" sz="1700" dirty="0">
+                <a:latin typeface="Courier" charset="0"/>
+              </a:rPr>
+              <a:t>     </a:t>
+            </a:r>
+            <a:r>
+              <a:rPr lang="en-US" sz="1700" dirty="0" smtClean="0">
+                <a:solidFill>
+                  <a:srgbClr val="797979"/>
+                </a:solidFill>
+                <a:latin typeface="Courier" charset="0"/>
+              </a:rPr>
+              <a:t>.</a:t>
+            </a:r>
+            <a:r>
+              <a:rPr lang="en-US" sz="1700" dirty="0" err="1">
+                <a:solidFill>
+                  <a:srgbClr val="8F9F36"/>
+                </a:solidFill>
+                <a:latin typeface="Courier" charset="0"/>
+              </a:rPr>
+              <a:t>subscribeOn</a:t>
+            </a:r>
+            <a:r>
+              <a:rPr lang="en-US" sz="1700" dirty="0">
+                <a:solidFill>
+                  <a:srgbClr val="797979"/>
+                </a:solidFill>
+                <a:latin typeface="Courier" charset="0"/>
+              </a:rPr>
+              <a:t>(</a:t>
+            </a:r>
+            <a:r>
+              <a:rPr lang="en-US" sz="1700" dirty="0" err="1">
+                <a:latin typeface="Courier" charset="0"/>
+              </a:rPr>
+              <a:t>Schedulers</a:t>
+            </a:r>
+            <a:r>
+              <a:rPr lang="en-US" sz="1700" dirty="0" err="1">
+                <a:solidFill>
+                  <a:srgbClr val="797979"/>
+                </a:solidFill>
+                <a:latin typeface="Courier" charset="0"/>
+              </a:rPr>
+              <a:t>.</a:t>
+            </a:r>
+            <a:r>
+              <a:rPr lang="en-US" sz="1700" dirty="0" err="1">
+                <a:solidFill>
+                  <a:srgbClr val="8F9F36"/>
+                </a:solidFill>
+                <a:latin typeface="Courier" charset="0"/>
+              </a:rPr>
+              <a:t>io</a:t>
+            </a:r>
+            <a:r>
+              <a:rPr lang="en-US" sz="1700" dirty="0">
+                <a:solidFill>
+                  <a:srgbClr val="797979"/>
+                </a:solidFill>
+                <a:latin typeface="Courier" charset="0"/>
+              </a:rPr>
+              <a:t>())</a:t>
+            </a:r>
+            <a:endParaRPr lang="en-US" sz="1700" dirty="0">
+              <a:latin typeface="Courier" charset="0"/>
+            </a:endParaRPr>
+          </a:p>
+          <a:p>
+            <a:pPr marL="0" indent="0">
+              <a:buNone/>
+            </a:pPr>
+            <a:r>
+              <a:rPr lang="en-US" sz="1700" dirty="0">
+                <a:latin typeface="Courier" charset="0"/>
+              </a:rPr>
+              <a:t>     </a:t>
+            </a:r>
+            <a:r>
+              <a:rPr lang="en-US" sz="1700" dirty="0" smtClean="0">
+                <a:solidFill>
+                  <a:srgbClr val="797979"/>
+                </a:solidFill>
+                <a:latin typeface="Courier" charset="0"/>
+              </a:rPr>
+              <a:t>.</a:t>
+            </a:r>
+            <a:r>
+              <a:rPr lang="en-US" sz="1700" dirty="0" err="1">
+                <a:solidFill>
+                  <a:srgbClr val="8F9F36"/>
+                </a:solidFill>
+                <a:latin typeface="Courier" charset="0"/>
+              </a:rPr>
+              <a:t>observeOn</a:t>
+            </a:r>
+            <a:r>
+              <a:rPr lang="en-US" sz="1700" dirty="0">
+                <a:solidFill>
+                  <a:srgbClr val="797979"/>
+                </a:solidFill>
+                <a:latin typeface="Courier" charset="0"/>
+              </a:rPr>
+              <a:t>(</a:t>
+            </a:r>
+            <a:r>
+              <a:rPr lang="en-US" sz="1700" dirty="0" err="1">
+                <a:latin typeface="Courier" charset="0"/>
+              </a:rPr>
+              <a:t>AndroidSchedulers</a:t>
+            </a:r>
+            <a:r>
+              <a:rPr lang="en-US" sz="1700" dirty="0" err="1">
+                <a:solidFill>
+                  <a:srgbClr val="797979"/>
+                </a:solidFill>
+                <a:latin typeface="Courier" charset="0"/>
+              </a:rPr>
+              <a:t>.</a:t>
+            </a:r>
+            <a:r>
+              <a:rPr lang="en-US" sz="1700" dirty="0" err="1">
+                <a:solidFill>
+                  <a:srgbClr val="8F9F36"/>
+                </a:solidFill>
+                <a:latin typeface="Courier" charset="0"/>
+              </a:rPr>
+              <a:t>mainThread</a:t>
+            </a:r>
+            <a:r>
+              <a:rPr lang="en-US" sz="1700" dirty="0">
+                <a:solidFill>
+                  <a:srgbClr val="797979"/>
+                </a:solidFill>
+                <a:latin typeface="Courier" charset="0"/>
+              </a:rPr>
+              <a:t>())</a:t>
+            </a:r>
+            <a:endParaRPr lang="en-US" sz="1700" dirty="0">
+              <a:latin typeface="Courier" charset="0"/>
+            </a:endParaRPr>
+          </a:p>
+          <a:p>
+            <a:pPr marL="0" indent="0">
+              <a:buNone/>
+            </a:pPr>
+            <a:r>
+              <a:rPr lang="en-US" sz="1700" dirty="0">
+                <a:latin typeface="Courier" charset="0"/>
+              </a:rPr>
+              <a:t>     </a:t>
+            </a:r>
+            <a:r>
+              <a:rPr lang="en-US" sz="1700" dirty="0" smtClean="0">
+                <a:solidFill>
+                  <a:srgbClr val="797979"/>
+                </a:solidFill>
+                <a:latin typeface="Courier" charset="0"/>
+              </a:rPr>
+              <a:t>.</a:t>
+            </a:r>
+            <a:r>
+              <a:rPr lang="en-US" sz="1700" dirty="0">
+                <a:solidFill>
+                  <a:srgbClr val="8F9F36"/>
+                </a:solidFill>
+                <a:latin typeface="Courier" charset="0"/>
+              </a:rPr>
+              <a:t>subscribe</a:t>
+            </a:r>
+            <a:r>
+              <a:rPr lang="en-US" sz="1700" dirty="0">
+                <a:solidFill>
+                  <a:srgbClr val="797979"/>
+                </a:solidFill>
+                <a:latin typeface="Courier" charset="0"/>
+              </a:rPr>
+              <a:t>(</a:t>
+            </a:r>
+            <a:r>
+              <a:rPr lang="en-US" sz="1700" dirty="0">
+                <a:latin typeface="Courier" charset="0"/>
+              </a:rPr>
+              <a:t>result </a:t>
+            </a:r>
+            <a:r>
+              <a:rPr lang="en-US" sz="1700" dirty="0" smtClean="0">
+                <a:solidFill>
+                  <a:srgbClr val="797979"/>
+                </a:solidFill>
+                <a:latin typeface="Courier" charset="0"/>
+              </a:rPr>
+              <a:t>-&gt; </a:t>
+            </a:r>
+            <a:r>
+              <a:rPr lang="en-US" sz="1700" dirty="0" smtClean="0">
+                <a:latin typeface="Courier" charset="0"/>
+              </a:rPr>
+              <a:t>);</a:t>
+            </a:r>
+          </a:p>
+          <a:p>
+            <a:pPr marL="0" indent="0">
+              <a:buNone/>
+            </a:pPr>
+            <a:r>
+              <a:rPr lang="en-US" sz="1700" dirty="0">
+                <a:latin typeface="Courier" charset="0"/>
+              </a:rPr>
+              <a:t>)</a:t>
+            </a:r>
+            <a:endParaRPr lang="is-IS" sz="1700" dirty="0">
+              <a:latin typeface="Courier" charset="0"/>
+            </a:endParaRPr>
           </a:p>
         </p:txBody>
       </p:sp>
     </p:spTree>
     <p:extLst>
       <p:ext uri="{BB962C8B-B14F-4D97-AF65-F5344CB8AC3E}">
-        <p14:creationId xmlns:p14="http://schemas.microsoft.com/office/powerpoint/2010/main" val="209987760"/>
+        <p14:creationId xmlns:p14="http://schemas.microsoft.com/office/powerpoint/2010/main" val="518851311"/>
       </p:ext>
     </p:extLst>
   </p:cSld>
   <p:clrMapOvr>
     <a:masterClrMapping/>
   </p:clrMapOvr>
+  <p:timing>
+    <p:tnLst>
+      <p:par>
+        <p:cTn id="1" dur="indefinite" restart="never" nodeType="tmRoot"/>
+      </p:par>
+    </p:tnLst>
+  </p:timing>
 </p:sld>
 </file>
 
@@ -2637,35 +3943,10 @@
       </p:grpSpPr>
       <p:sp>
         <p:nvSpPr>
-          <p:cNvPr id="2" name="Контейнер за съдържание 1">
+          <p:cNvPr id="2" name="Заглавие 1">
             <a:extLst>
               <a:ext uri="{FF2B5EF4-FFF2-40B4-BE49-F238E27FC236}">
-                <a16:creationId xmlns:a16="http://schemas.microsoft.com/office/drawing/2014/main" id="{6796BF07-8AA6-4364-A042-271476C377C2}"/>
-              </a:ext>
-            </a:extLst>
-          </p:cNvPr>
-          <p:cNvSpPr>
-            <a:spLocks noGrp="1"/>
-          </p:cNvSpPr>
-          <p:nvPr>
-            <p:ph sz="quarter" idx="13"/>
-          </p:nvPr>
-        </p:nvSpPr>
-        <p:spPr/>
-        <p:txBody>
-          <a:bodyPr/>
-          <a:lstStyle/>
-          <a:p>
-            <a:endParaRPr lang="en-US"/>
-          </a:p>
-        </p:txBody>
-      </p:sp>
-      <p:sp>
-        <p:nvSpPr>
-          <p:cNvPr id="3" name="Заглавие 2">
-            <a:extLst>
-              <a:ext uri="{FF2B5EF4-FFF2-40B4-BE49-F238E27FC236}">
-                <a16:creationId xmlns:a16="http://schemas.microsoft.com/office/drawing/2014/main" id="{F820DDDD-D643-46A1-967F-CF98AC0192D4}"/>
+                <a16:creationId xmlns:a16="http://schemas.microsoft.com/office/drawing/2014/main" xmlns="" id="{CBAA30A0-82D2-4B77-A9FB-608F082876E3}"/>
               </a:ext>
             </a:extLst>
           </p:cNvPr>
@@ -2682,11 +3963,11 @@
           <a:lstStyle/>
           <a:p>
             <a:r>
-              <a:rPr lang="en-US" dirty="0"/>
-              <a:t>Downloading Images with </a:t>
-            </a:r>
-            <a:r>
-              <a:rPr lang="en-US" dirty="0" err="1"/>
+              <a:rPr lang="en-US" dirty="0" smtClean="0"/>
+              <a:t>Unit testing with </a:t>
+            </a:r>
+            <a:r>
+              <a:rPr lang="en-US" dirty="0" err="1" smtClean="0"/>
               <a:t>ReactiveX</a:t>
             </a:r>
             <a:endParaRPr lang="en-US" dirty="0"/>
@@ -2695,10 +3976,10 @@
       </p:sp>
       <p:sp>
         <p:nvSpPr>
-          <p:cNvPr id="4" name="Контейнер за съдържание 3">
+          <p:cNvPr id="3" name="Контейнер за съдържание 2">
             <a:extLst>
               <a:ext uri="{FF2B5EF4-FFF2-40B4-BE49-F238E27FC236}">
-                <a16:creationId xmlns:a16="http://schemas.microsoft.com/office/drawing/2014/main" id="{E3A1FA28-7747-47E4-83CE-31D1024A151D}"/>
+                <a16:creationId xmlns:a16="http://schemas.microsoft.com/office/drawing/2014/main" xmlns="" id="{5FB44CFC-8C34-4A01-AF74-7FF6AF22077E}"/>
               </a:ext>
             </a:extLst>
           </p:cNvPr>
@@ -2706,28 +3987,170 @@
             <a:spLocks noGrp="1"/>
           </p:cNvSpPr>
           <p:nvPr>
-            <p:ph sz="quarter" idx="14"/>
+            <p:ph idx="1"/>
           </p:nvPr>
         </p:nvSpPr>
-        <p:spPr/>
+        <p:spPr>
+          <a:xfrm>
+            <a:off x="417622" y="1504709"/>
+            <a:ext cx="10363200" cy="4891324"/>
+          </a:xfrm>
+        </p:spPr>
         <p:txBody>
-          <a:bodyPr/>
+          <a:bodyPr>
+            <a:normAutofit/>
+          </a:bodyPr>
           <a:lstStyle/>
           <a:p>
-            <a:endParaRPr lang="en-US"/>
+            <a:r>
+              <a:rPr lang="en-US" sz="3200" dirty="0" smtClean="0"/>
+              <a:t>One of the biggest problems with </a:t>
+            </a:r>
+            <a:r>
+              <a:rPr lang="en-US" sz="3200" dirty="0" err="1" smtClean="0"/>
+              <a:t>async</a:t>
+            </a:r>
+            <a:r>
+              <a:rPr lang="en-US" sz="3200" dirty="0" smtClean="0"/>
+              <a:t> code is unit testing</a:t>
+            </a:r>
+          </a:p>
+          <a:p>
+            <a:pPr lvl="1"/>
+            <a:r>
+              <a:rPr lang="en-US" dirty="0" smtClean="0"/>
+              <a:t>Managing the UI/Background threads</a:t>
+            </a:r>
+          </a:p>
+          <a:p>
+            <a:pPr lvl="2"/>
+            <a:r>
+              <a:rPr lang="en-US" dirty="0" smtClean="0"/>
+              <a:t>Some times the unit tests pass, even if they shouldn’t</a:t>
+            </a:r>
+          </a:p>
+          <a:p>
+            <a:pPr lvl="1"/>
+            <a:r>
+              <a:rPr lang="en-US" dirty="0" smtClean="0"/>
+              <a:t>We need Android development and/or </a:t>
+            </a:r>
+            <a:r>
+              <a:rPr lang="en-US" dirty="0" err="1" smtClean="0"/>
+              <a:t>Thread.sleep</a:t>
+            </a:r>
+            <a:r>
+              <a:rPr lang="en-US" dirty="0" smtClean="0"/>
+              <a:t>() to make it work</a:t>
+            </a:r>
+            <a:r>
+              <a:rPr lang="mr-IN" dirty="0" smtClean="0"/>
+              <a:t>…</a:t>
+            </a:r>
+            <a:endParaRPr lang="en-US" dirty="0" smtClean="0"/>
+          </a:p>
+          <a:p>
+            <a:pPr marL="571500" lvl="1" indent="-571500" defTabSz="91440">
+              <a:spcBef>
+                <a:spcPts val="1000"/>
+              </a:spcBef>
+              <a:tabLst/>
+            </a:pPr>
+            <a:r>
+              <a:rPr lang="en-US" sz="3200" dirty="0" err="1">
+                <a:solidFill>
+                  <a:schemeClr val="tx1"/>
+                </a:solidFill>
+              </a:rPr>
+              <a:t>Schedulers.trampoline</a:t>
+            </a:r>
+            <a:r>
+              <a:rPr lang="en-US" sz="3200" dirty="0">
+                <a:solidFill>
+                  <a:schemeClr val="tx1"/>
+                </a:solidFill>
+              </a:rPr>
+              <a:t>() </a:t>
+            </a:r>
+            <a:r>
+              <a:rPr lang="en-US" sz="3200" dirty="0" smtClean="0">
+                <a:solidFill>
+                  <a:schemeClr val="tx1"/>
+                </a:solidFill>
+              </a:rPr>
+              <a:t>handles that in </a:t>
+            </a:r>
+            <a:r>
+              <a:rPr lang="en-US" sz="3200" dirty="0" err="1" smtClean="0">
+                <a:solidFill>
+                  <a:schemeClr val="tx1"/>
+                </a:solidFill>
+              </a:rPr>
+              <a:t>RxAndroid</a:t>
+            </a:r>
+            <a:r>
+              <a:rPr lang="en-US" sz="3200" dirty="0" smtClean="0">
+                <a:solidFill>
+                  <a:schemeClr val="tx1"/>
+                </a:solidFill>
+              </a:rPr>
+              <a:t>:</a:t>
+            </a:r>
+          </a:p>
+          <a:p>
+            <a:pPr marL="914400" lvl="2" indent="-571500" defTabSz="91440">
+              <a:spcBef>
+                <a:spcPts val="1000"/>
+              </a:spcBef>
+            </a:pPr>
+            <a:r>
+              <a:rPr lang="en-US" sz="2800" dirty="0" smtClean="0">
+                <a:solidFill>
+                  <a:schemeClr val="tx1"/>
+                </a:solidFill>
+              </a:rPr>
+              <a:t>Executes all operations one-by-one</a:t>
+            </a:r>
+          </a:p>
+          <a:p>
+            <a:pPr marL="1314450" lvl="3" indent="-571500" defTabSz="91440">
+              <a:spcBef>
+                <a:spcPts val="1000"/>
+              </a:spcBef>
+            </a:pPr>
+            <a:r>
+              <a:rPr lang="en-US" sz="2600" dirty="0" smtClean="0">
+                <a:solidFill>
+                  <a:schemeClr val="tx1"/>
+                </a:solidFill>
+              </a:rPr>
+              <a:t>i.e. sync</a:t>
+            </a:r>
+            <a:endParaRPr lang="en-US" sz="2600" dirty="0">
+              <a:solidFill>
+                <a:schemeClr val="tx1"/>
+              </a:solidFill>
+            </a:endParaRPr>
           </a:p>
         </p:txBody>
       </p:sp>
     </p:spTree>
     <p:extLst>
       <p:ext uri="{BB962C8B-B14F-4D97-AF65-F5344CB8AC3E}">
-        <p14:creationId xmlns:p14="http://schemas.microsoft.com/office/powerpoint/2010/main" val="4059581978"/>
+        <p14:creationId xmlns:p14="http://schemas.microsoft.com/office/powerpoint/2010/main" val="322559699"/>
       </p:ext>
     </p:extLst>
   </p:cSld>
   <p:clrMapOvr>
     <a:masterClrMapping/>
   </p:clrMapOvr>
+  <p:timing>
+    <p:tnLst>
+      <p:par>
+        <p:cTn id="1" dur="indefinite" restart="never" nodeType="tmRoot"/>
+      </p:par>
+    </p:tnLst>
+  </p:timing>
 </p:sld>
 </file>
 
@@ -2750,35 +4173,10 @@
       </p:grpSpPr>
       <p:sp>
         <p:nvSpPr>
-          <p:cNvPr id="2" name="Контейнер за съдържание 1">
+          <p:cNvPr id="2" name="Заглавие 1">
             <a:extLst>
               <a:ext uri="{FF2B5EF4-FFF2-40B4-BE49-F238E27FC236}">
-                <a16:creationId xmlns:a16="http://schemas.microsoft.com/office/drawing/2014/main" id="{83A74361-D8BE-4931-B1DA-1FE96EE0BDA9}"/>
-              </a:ext>
-            </a:extLst>
-          </p:cNvPr>
-          <p:cNvSpPr>
-            <a:spLocks noGrp="1"/>
-          </p:cNvSpPr>
-          <p:nvPr>
-            <p:ph sz="quarter" idx="13"/>
-          </p:nvPr>
-        </p:nvSpPr>
-        <p:spPr/>
-        <p:txBody>
-          <a:bodyPr/>
-          <a:lstStyle/>
-          <a:p>
-            <a:endParaRPr lang="en-US"/>
-          </a:p>
-        </p:txBody>
-      </p:sp>
-      <p:sp>
-        <p:nvSpPr>
-          <p:cNvPr id="3" name="Заглавие 2">
-            <a:extLst>
-              <a:ext uri="{FF2B5EF4-FFF2-40B4-BE49-F238E27FC236}">
-                <a16:creationId xmlns:a16="http://schemas.microsoft.com/office/drawing/2014/main" id="{15EE34A6-5757-432D-A94D-0FD979E3F1A7}"/>
+                <a16:creationId xmlns:a16="http://schemas.microsoft.com/office/drawing/2014/main" xmlns="" id="{CBAA30A0-82D2-4B77-A9FB-608F082876E3}"/>
               </a:ext>
             </a:extLst>
           </p:cNvPr>
@@ -2795,11 +4193,11 @@
           <a:lstStyle/>
           <a:p>
             <a:r>
-              <a:rPr lang="en-US" dirty="0"/>
-              <a:t>Unit Testing with </a:t>
-            </a:r>
-            <a:r>
-              <a:rPr lang="en-US" dirty="0" err="1"/>
+              <a:rPr lang="en-US" dirty="0" smtClean="0"/>
+              <a:t>Demo: Unit testing with </a:t>
+            </a:r>
+            <a:r>
+              <a:rPr lang="en-US" dirty="0" err="1" smtClean="0"/>
               <a:t>ReactiveX</a:t>
             </a:r>
             <a:endParaRPr lang="en-US" dirty="0"/>
@@ -2808,10 +4206,10 @@
       </p:sp>
       <p:sp>
         <p:nvSpPr>
-          <p:cNvPr id="4" name="Контейнер за съдържание 3">
+          <p:cNvPr id="3" name="Контейнер за съдържание 2">
             <a:extLst>
               <a:ext uri="{FF2B5EF4-FFF2-40B4-BE49-F238E27FC236}">
-                <a16:creationId xmlns:a16="http://schemas.microsoft.com/office/drawing/2014/main" id="{7B0C4270-C27D-4319-8D48-B4E13D961F70}"/>
+                <a16:creationId xmlns:a16="http://schemas.microsoft.com/office/drawing/2014/main" xmlns="" id="{5FB44CFC-8C34-4A01-AF74-7FF6AF22077E}"/>
               </a:ext>
             </a:extLst>
           </p:cNvPr>
@@ -2819,28 +4217,439 @@
             <a:spLocks noGrp="1"/>
           </p:cNvSpPr>
           <p:nvPr>
-            <p:ph sz="quarter" idx="14"/>
+            <p:ph idx="1"/>
           </p:nvPr>
         </p:nvSpPr>
-        <p:spPr/>
+        <p:spPr>
+          <a:xfrm>
+            <a:off x="417622" y="1504709"/>
+            <a:ext cx="10363200" cy="4891324"/>
+          </a:xfrm>
+        </p:spPr>
         <p:txBody>
-          <a:bodyPr/>
+          <a:bodyPr>
+            <a:normAutofit/>
+          </a:bodyPr>
           <a:lstStyle/>
           <a:p>
-            <a:endParaRPr lang="en-US"/>
+            <a:pPr marL="0" indent="0">
+              <a:buNone/>
+            </a:pPr>
+            <a:r>
+              <a:rPr lang="is-IS" sz="1800" dirty="0" smtClean="0">
+                <a:solidFill>
+                  <a:srgbClr val="BB49FF"/>
+                </a:solidFill>
+                <a:latin typeface="Courier" charset="0"/>
+              </a:rPr>
+              <a:t>@</a:t>
+            </a:r>
+            <a:r>
+              <a:rPr lang="is-IS" sz="1800" dirty="0">
+                <a:solidFill>
+                  <a:srgbClr val="BB49FF"/>
+                </a:solidFill>
+                <a:latin typeface="Courier" charset="0"/>
+              </a:rPr>
+              <a:t>Test</a:t>
+            </a:r>
+          </a:p>
+          <a:p>
+            <a:pPr marL="0" indent="0">
+              <a:buNone/>
+            </a:pPr>
+            <a:r>
+              <a:rPr lang="is-IS" sz="1800" b="1" dirty="0" smtClean="0">
+                <a:solidFill>
+                  <a:srgbClr val="008F00"/>
+                </a:solidFill>
+                <a:latin typeface="Courier" charset="0"/>
+              </a:rPr>
+              <a:t>public</a:t>
+            </a:r>
+            <a:r>
+              <a:rPr lang="is-IS" sz="1800" dirty="0" smtClean="0">
+                <a:solidFill>
+                  <a:srgbClr val="000000"/>
+                </a:solidFill>
+                <a:latin typeface="Courier" charset="0"/>
+              </a:rPr>
+              <a:t> </a:t>
+            </a:r>
+            <a:r>
+              <a:rPr lang="is-IS" sz="1800" dirty="0">
+                <a:solidFill>
+                  <a:srgbClr val="C01E51"/>
+                </a:solidFill>
+                <a:latin typeface="Courier" charset="0"/>
+              </a:rPr>
+              <a:t>void</a:t>
+            </a:r>
+            <a:r>
+              <a:rPr lang="is-IS" sz="1800" dirty="0">
+                <a:solidFill>
+                  <a:srgbClr val="000000"/>
+                </a:solidFill>
+                <a:latin typeface="Courier" charset="0"/>
+              </a:rPr>
+              <a:t> </a:t>
+            </a:r>
+            <a:r>
+              <a:rPr lang="is-IS" sz="1800" dirty="0" smtClean="0">
+                <a:solidFill>
+                  <a:srgbClr val="0433FF"/>
+                </a:solidFill>
+                <a:latin typeface="Courier" charset="0"/>
+              </a:rPr>
+              <a:t>test</a:t>
+            </a:r>
+            <a:r>
+              <a:rPr lang="is-IS" sz="1800" dirty="0" smtClean="0">
+                <a:solidFill>
+                  <a:srgbClr val="797979"/>
+                </a:solidFill>
+                <a:latin typeface="Courier" charset="0"/>
+              </a:rPr>
+              <a:t>(){</a:t>
+            </a:r>
+            <a:endParaRPr lang="is-IS" sz="1800" dirty="0">
+              <a:solidFill>
+                <a:srgbClr val="0433FF"/>
+              </a:solidFill>
+              <a:latin typeface="Courier" charset="0"/>
+            </a:endParaRPr>
+          </a:p>
+          <a:p>
+            <a:pPr marL="0" indent="0">
+              <a:buNone/>
+            </a:pPr>
+            <a:r>
+              <a:rPr lang="is-IS" sz="1800" dirty="0" smtClean="0">
+                <a:latin typeface="Courier" charset="0"/>
+              </a:rPr>
+              <a:t>  repository</a:t>
+            </a:r>
+            <a:r>
+              <a:rPr lang="is-IS" sz="1800" dirty="0" smtClean="0">
+                <a:solidFill>
+                  <a:srgbClr val="797979"/>
+                </a:solidFill>
+                <a:latin typeface="Courier" charset="0"/>
+              </a:rPr>
+              <a:t>.</a:t>
+            </a:r>
+            <a:r>
+              <a:rPr lang="is-IS" sz="1800" dirty="0" smtClean="0">
+                <a:solidFill>
+                  <a:srgbClr val="8F9F36"/>
+                </a:solidFill>
+                <a:latin typeface="Courier" charset="0"/>
+              </a:rPr>
+              <a:t>getWithObservable</a:t>
+            </a:r>
+            <a:r>
+              <a:rPr lang="is-IS" sz="1800" dirty="0">
+                <a:solidFill>
+                  <a:srgbClr val="797979"/>
+                </a:solidFill>
+                <a:latin typeface="Courier" charset="0"/>
+              </a:rPr>
+              <a:t>()</a:t>
+            </a:r>
+            <a:endParaRPr lang="is-IS" sz="1800" dirty="0">
+              <a:latin typeface="Courier" charset="0"/>
+            </a:endParaRPr>
+          </a:p>
+          <a:p>
+            <a:pPr marL="0" indent="0">
+              <a:buNone/>
+            </a:pPr>
+            <a:r>
+              <a:rPr lang="is-IS" sz="1800" dirty="0">
+                <a:latin typeface="Courier" charset="0"/>
+              </a:rPr>
+              <a:t>  </a:t>
+            </a:r>
+            <a:r>
+              <a:rPr lang="is-IS" sz="1800" dirty="0" smtClean="0">
+                <a:latin typeface="Courier" charset="0"/>
+              </a:rPr>
+              <a:t>  </a:t>
+            </a:r>
+            <a:r>
+              <a:rPr lang="is-IS" sz="1800" dirty="0">
+                <a:latin typeface="Courier" charset="0"/>
+              </a:rPr>
+              <a:t>         </a:t>
+            </a:r>
+            <a:r>
+              <a:rPr lang="is-IS" sz="1800" dirty="0" smtClean="0">
+                <a:solidFill>
+                  <a:srgbClr val="797979"/>
+                </a:solidFill>
+                <a:latin typeface="Courier" charset="0"/>
+              </a:rPr>
+              <a:t>.</a:t>
+            </a:r>
+            <a:r>
+              <a:rPr lang="is-IS" sz="1800" dirty="0">
+                <a:solidFill>
+                  <a:srgbClr val="8F9F36"/>
+                </a:solidFill>
+                <a:latin typeface="Courier" charset="0"/>
+              </a:rPr>
+              <a:t>subscribeOn</a:t>
+            </a:r>
+            <a:r>
+              <a:rPr lang="is-IS" sz="1800" dirty="0">
+                <a:solidFill>
+                  <a:srgbClr val="797979"/>
+                </a:solidFill>
+                <a:latin typeface="Courier" charset="0"/>
+              </a:rPr>
+              <a:t>(</a:t>
+            </a:r>
+            <a:r>
+              <a:rPr lang="is-IS" sz="1800" dirty="0">
+                <a:latin typeface="Courier" charset="0"/>
+              </a:rPr>
+              <a:t>Schedulers</a:t>
+            </a:r>
+            <a:r>
+              <a:rPr lang="is-IS" sz="1800" dirty="0">
+                <a:solidFill>
+                  <a:srgbClr val="797979"/>
+                </a:solidFill>
+                <a:latin typeface="Courier" charset="0"/>
+              </a:rPr>
+              <a:t>.</a:t>
+            </a:r>
+            <a:r>
+              <a:rPr lang="is-IS" sz="1800" dirty="0">
+                <a:solidFill>
+                  <a:srgbClr val="8F9F36"/>
+                </a:solidFill>
+                <a:latin typeface="Courier" charset="0"/>
+              </a:rPr>
+              <a:t>trampoline</a:t>
+            </a:r>
+            <a:r>
+              <a:rPr lang="is-IS" sz="1800" dirty="0">
+                <a:solidFill>
+                  <a:srgbClr val="797979"/>
+                </a:solidFill>
+                <a:latin typeface="Courier" charset="0"/>
+              </a:rPr>
+              <a:t>())</a:t>
+            </a:r>
+            <a:endParaRPr lang="is-IS" sz="1800" dirty="0">
+              <a:latin typeface="Courier" charset="0"/>
+            </a:endParaRPr>
+          </a:p>
+          <a:p>
+            <a:pPr marL="0" indent="0">
+              <a:buNone/>
+            </a:pPr>
+            <a:r>
+              <a:rPr lang="is-IS" sz="1800" dirty="0">
+                <a:latin typeface="Courier" charset="0"/>
+              </a:rPr>
+              <a:t>             </a:t>
+            </a:r>
+            <a:r>
+              <a:rPr lang="is-IS" sz="1800" dirty="0" smtClean="0">
+                <a:solidFill>
+                  <a:srgbClr val="797979"/>
+                </a:solidFill>
+                <a:latin typeface="Courier" charset="0"/>
+              </a:rPr>
+              <a:t>.</a:t>
+            </a:r>
+            <a:r>
+              <a:rPr lang="is-IS" sz="1800" dirty="0">
+                <a:solidFill>
+                  <a:srgbClr val="8F9F36"/>
+                </a:solidFill>
+                <a:latin typeface="Courier" charset="0"/>
+              </a:rPr>
+              <a:t>observeOn</a:t>
+            </a:r>
+            <a:r>
+              <a:rPr lang="is-IS" sz="1800" dirty="0">
+                <a:solidFill>
+                  <a:srgbClr val="797979"/>
+                </a:solidFill>
+                <a:latin typeface="Courier" charset="0"/>
+              </a:rPr>
+              <a:t>(</a:t>
+            </a:r>
+            <a:r>
+              <a:rPr lang="is-IS" sz="1800" dirty="0">
+                <a:latin typeface="Courier" charset="0"/>
+              </a:rPr>
+              <a:t>Schedulers</a:t>
+            </a:r>
+            <a:r>
+              <a:rPr lang="is-IS" sz="1800" dirty="0">
+                <a:solidFill>
+                  <a:srgbClr val="797979"/>
+                </a:solidFill>
+                <a:latin typeface="Courier" charset="0"/>
+              </a:rPr>
+              <a:t>.</a:t>
+            </a:r>
+            <a:r>
+              <a:rPr lang="is-IS" sz="1800" dirty="0">
+                <a:solidFill>
+                  <a:srgbClr val="8F9F36"/>
+                </a:solidFill>
+                <a:latin typeface="Courier" charset="0"/>
+              </a:rPr>
+              <a:t>trampoline</a:t>
+            </a:r>
+            <a:r>
+              <a:rPr lang="is-IS" sz="1800" dirty="0">
+                <a:solidFill>
+                  <a:srgbClr val="797979"/>
+                </a:solidFill>
+                <a:latin typeface="Courier" charset="0"/>
+              </a:rPr>
+              <a:t>())</a:t>
+            </a:r>
+            <a:endParaRPr lang="is-IS" sz="1800" dirty="0">
+              <a:latin typeface="Courier" charset="0"/>
+            </a:endParaRPr>
+          </a:p>
+          <a:p>
+            <a:pPr marL="0" indent="0">
+              <a:buNone/>
+            </a:pPr>
+            <a:r>
+              <a:rPr lang="is-IS" sz="1800" dirty="0">
+                <a:latin typeface="Courier" charset="0"/>
+              </a:rPr>
+              <a:t>             </a:t>
+            </a:r>
+            <a:r>
+              <a:rPr lang="is-IS" sz="1800" dirty="0" smtClean="0">
+                <a:solidFill>
+                  <a:srgbClr val="797979"/>
+                </a:solidFill>
+                <a:latin typeface="Courier" charset="0"/>
+              </a:rPr>
+              <a:t>.</a:t>
+            </a:r>
+            <a:r>
+              <a:rPr lang="is-IS" sz="1800" dirty="0" smtClean="0">
+                <a:solidFill>
+                  <a:srgbClr val="8F9F36"/>
+                </a:solidFill>
+                <a:latin typeface="Courier" charset="0"/>
+              </a:rPr>
+              <a:t>subscribe</a:t>
+            </a:r>
+            <a:r>
+              <a:rPr lang="is-IS" sz="1800" dirty="0" smtClean="0">
+                <a:solidFill>
+                  <a:srgbClr val="797979"/>
+                </a:solidFill>
+                <a:latin typeface="Courier" charset="0"/>
+              </a:rPr>
+              <a:t>(</a:t>
+            </a:r>
+            <a:r>
+              <a:rPr lang="is-IS" sz="1800" dirty="0">
+                <a:latin typeface="Courier" charset="0"/>
+              </a:rPr>
+              <a:t>booksList </a:t>
+            </a:r>
+            <a:r>
+              <a:rPr lang="is-IS" sz="1800" dirty="0" smtClean="0">
+                <a:latin typeface="Courier" charset="0"/>
+              </a:rPr>
+              <a:t>-&gt;</a:t>
+            </a:r>
+          </a:p>
+          <a:p>
+            <a:pPr marL="0" indent="0">
+              <a:buNone/>
+            </a:pPr>
+            <a:r>
+              <a:rPr lang="is-IS" sz="1800">
+                <a:latin typeface="Courier" charset="0"/>
+              </a:rPr>
+              <a:t> </a:t>
+            </a:r>
+            <a:r>
+              <a:rPr lang="is-IS" sz="1800" smtClean="0">
+                <a:latin typeface="Courier" charset="0"/>
+              </a:rPr>
+              <a:t>              // Asserts here</a:t>
+            </a:r>
+            <a:endParaRPr lang="is-IS" sz="1800" dirty="0">
+              <a:latin typeface="Courier" charset="0"/>
+            </a:endParaRPr>
+          </a:p>
+          <a:p>
+            <a:pPr marL="0" indent="0">
+              <a:buNone/>
+            </a:pPr>
+            <a:r>
+              <a:rPr lang="is-IS" sz="1800" dirty="0" smtClean="0">
+                <a:latin typeface="Courier" charset="0"/>
+              </a:rPr>
+              <a:t>             </a:t>
+            </a:r>
+            <a:r>
+              <a:rPr lang="is-IS" sz="1800" dirty="0" smtClean="0">
+                <a:solidFill>
+                  <a:srgbClr val="797979"/>
+                </a:solidFill>
+                <a:latin typeface="Courier" charset="0"/>
+              </a:rPr>
+              <a:t>);</a:t>
+            </a:r>
+            <a:endParaRPr lang="is-IS" sz="1800" dirty="0" smtClean="0">
+              <a:latin typeface="Courier" charset="0"/>
+            </a:endParaRPr>
+          </a:p>
+          <a:p>
+            <a:pPr marL="0" indent="0">
+              <a:buNone/>
+            </a:pPr>
+            <a:r>
+              <a:rPr lang="is-IS" sz="1800" dirty="0" smtClean="0">
+                <a:solidFill>
+                  <a:srgbClr val="797979"/>
+                </a:solidFill>
+                <a:latin typeface="Courier" charset="0"/>
+              </a:rPr>
+              <a:t>}</a:t>
+            </a:r>
+            <a:endParaRPr lang="is-IS" sz="1800" dirty="0">
+              <a:effectLst/>
+              <a:latin typeface="Courier" charset="0"/>
+            </a:endParaRPr>
           </a:p>
         </p:txBody>
       </p:sp>
     </p:spTree>
     <p:extLst>
       <p:ext uri="{BB962C8B-B14F-4D97-AF65-F5344CB8AC3E}">
-        <p14:creationId xmlns:p14="http://schemas.microsoft.com/office/powerpoint/2010/main" val="3999980670"/>
+        <p14:creationId xmlns:p14="http://schemas.microsoft.com/office/powerpoint/2010/main" val="1070033310"/>
       </p:ext>
     </p:extLst>
   </p:cSld>
   <p:clrMapOvr>
     <a:masterClrMapping/>
   </p:clrMapOvr>
+  <p:timing>
+    <p:tnLst>
+      <p:par>
+        <p:cTn id="1" dur="indefinite" restart="never" nodeType="tmRoot"/>
+      </p:par>
+    </p:tnLst>
+  </p:timing>
 </p:sld>
 </file>
 
@@ -2866,7 +4675,7 @@
           <p:cNvPr id="5" name="Заглавие 4">
             <a:extLst>
               <a:ext uri="{FF2B5EF4-FFF2-40B4-BE49-F238E27FC236}">
-                <a16:creationId xmlns:a16="http://schemas.microsoft.com/office/drawing/2014/main" id="{6A6D53E4-49BC-4183-B4E0-89549F337F5A}"/>
+                <a16:creationId xmlns:a16="http://schemas.microsoft.com/office/drawing/2014/main" xmlns="" id="{6A6D53E4-49BC-4183-B4E0-89549F337F5A}"/>
               </a:ext>
             </a:extLst>
           </p:cNvPr>
@@ -2899,6 +4708,13 @@
   <p:clrMapOvr>
     <a:masterClrMapping/>
   </p:clrMapOvr>
+  <p:timing>
+    <p:tnLst>
+      <p:par>
+        <p:cTn id="1" dur="indefinite" restart="never" nodeType="tmRoot"/>
+      </p:par>
+    </p:tnLst>
+  </p:timing>
 </p:sld>
 </file>
 
@@ -2924,7 +4740,7 @@
           <p:cNvPr id="6" name="Контейнер за съдържание 5">
             <a:extLst>
               <a:ext uri="{FF2B5EF4-FFF2-40B4-BE49-F238E27FC236}">
-                <a16:creationId xmlns:a16="http://schemas.microsoft.com/office/drawing/2014/main" id="{D51119A7-DEB3-450B-BDCA-8579C68C4B22}"/>
+                <a16:creationId xmlns:a16="http://schemas.microsoft.com/office/drawing/2014/main" xmlns="" id="{D51119A7-DEB3-450B-BDCA-8579C68C4B22}"/>
               </a:ext>
             </a:extLst>
           </p:cNvPr>
@@ -3067,7 +4883,7 @@
           <p:cNvPr id="5" name="Заглавие 4">
             <a:extLst>
               <a:ext uri="{FF2B5EF4-FFF2-40B4-BE49-F238E27FC236}">
-                <a16:creationId xmlns:a16="http://schemas.microsoft.com/office/drawing/2014/main" id="{69E58EA2-9E5C-4F9A-8182-E1E5C9556C95}"/>
+                <a16:creationId xmlns:a16="http://schemas.microsoft.com/office/drawing/2014/main" xmlns="" id="{69E58EA2-9E5C-4F9A-8182-E1E5C9556C95}"/>
               </a:ext>
             </a:extLst>
           </p:cNvPr>
@@ -3095,7 +4911,7 @@
           <p:cNvPr id="1026" name="Picture 2" descr="https://github.com/Minkov/reactivex-android-seminar/raw/master/imgs/doncho-minkov.jpeg">
             <a:extLst>
               <a:ext uri="{FF2B5EF4-FFF2-40B4-BE49-F238E27FC236}">
-                <a16:creationId xmlns:a16="http://schemas.microsoft.com/office/drawing/2014/main" id="{509B8350-4A49-4B76-AF79-7198557B00B2}"/>
+                <a16:creationId xmlns:a16="http://schemas.microsoft.com/office/drawing/2014/main" xmlns="" id="{509B8350-4A49-4B76-AF79-7198557B00B2}"/>
               </a:ext>
             </a:extLst>
           </p:cNvPr>
@@ -3144,7 +4960,7 @@
           <p:cNvPr id="18" name="Картина 17">
             <a:extLst>
               <a:ext uri="{FF2B5EF4-FFF2-40B4-BE49-F238E27FC236}">
-                <a16:creationId xmlns:a16="http://schemas.microsoft.com/office/drawing/2014/main" id="{52D1BB0A-11E7-4DD4-8C37-6780ED0E37A0}"/>
+                <a16:creationId xmlns:a16="http://schemas.microsoft.com/office/drawing/2014/main" xmlns="" id="{52D1BB0A-11E7-4DD4-8C37-6780ED0E37A0}"/>
               </a:ext>
             </a:extLst>
           </p:cNvPr>
@@ -3180,7 +4996,7 @@
           <p:cNvPr id="20" name="Картина 19">
             <a:extLst>
               <a:ext uri="{FF2B5EF4-FFF2-40B4-BE49-F238E27FC236}">
-                <a16:creationId xmlns:a16="http://schemas.microsoft.com/office/drawing/2014/main" id="{28178210-EC33-476F-A47A-1B32C42C6C17}"/>
+                <a16:creationId xmlns:a16="http://schemas.microsoft.com/office/drawing/2014/main" xmlns="" id="{28178210-EC33-476F-A47A-1B32C42C6C17}"/>
               </a:ext>
             </a:extLst>
           </p:cNvPr>
@@ -3216,7 +5032,7 @@
           <p:cNvPr id="22" name="Картина 21">
             <a:extLst>
               <a:ext uri="{FF2B5EF4-FFF2-40B4-BE49-F238E27FC236}">
-                <a16:creationId xmlns:a16="http://schemas.microsoft.com/office/drawing/2014/main" id="{0BEDE2FB-F212-4F06-9499-51C0D071E809}"/>
+                <a16:creationId xmlns:a16="http://schemas.microsoft.com/office/drawing/2014/main" xmlns="" id="{0BEDE2FB-F212-4F06-9499-51C0D071E809}"/>
               </a:ext>
             </a:extLst>
           </p:cNvPr>
@@ -3252,7 +5068,7 @@
           <p:cNvPr id="23" name="Правоъгълник 22">
             <a:extLst>
               <a:ext uri="{FF2B5EF4-FFF2-40B4-BE49-F238E27FC236}">
-                <a16:creationId xmlns:a16="http://schemas.microsoft.com/office/drawing/2014/main" id="{D50D4F95-2304-4F90-80C7-D3C9188C202E}"/>
+                <a16:creationId xmlns:a16="http://schemas.microsoft.com/office/drawing/2014/main" xmlns="" id="{D50D4F95-2304-4F90-80C7-D3C9188C202E}"/>
               </a:ext>
             </a:extLst>
           </p:cNvPr>
@@ -3312,7 +5128,7 @@
           <p:cNvPr id="28" name="Правоъгълник 27">
             <a:extLst>
               <a:ext uri="{FF2B5EF4-FFF2-40B4-BE49-F238E27FC236}">
-                <a16:creationId xmlns:a16="http://schemas.microsoft.com/office/drawing/2014/main" id="{31DBD4D2-9BCD-4B3B-88E7-945B118AD153}"/>
+                <a16:creationId xmlns:a16="http://schemas.microsoft.com/office/drawing/2014/main" xmlns="" id="{31DBD4D2-9BCD-4B3B-88E7-945B118AD153}"/>
               </a:ext>
             </a:extLst>
           </p:cNvPr>
@@ -3364,7 +5180,7 @@
           <p:cNvPr id="29" name="Правоъгълник 28">
             <a:extLst>
               <a:ext uri="{FF2B5EF4-FFF2-40B4-BE49-F238E27FC236}">
-                <a16:creationId xmlns:a16="http://schemas.microsoft.com/office/drawing/2014/main" id="{E3A7E747-EE68-4785-BF85-5D0A982DADEE}"/>
+                <a16:creationId xmlns:a16="http://schemas.microsoft.com/office/drawing/2014/main" xmlns="" id="{E3A7E747-EE68-4785-BF85-5D0A982DADEE}"/>
               </a:ext>
             </a:extLst>
           </p:cNvPr>
@@ -3429,6 +5245,13 @@
   <p:clrMapOvr>
     <a:masterClrMapping/>
   </p:clrMapOvr>
+  <p:timing>
+    <p:tnLst>
+      <p:par>
+        <p:cTn id="1" dur="indefinite" restart="never" nodeType="tmRoot"/>
+      </p:par>
+    </p:tnLst>
+  </p:timing>
 </p:sld>
 </file>
 
@@ -3454,7 +5277,7 @@
           <p:cNvPr id="6" name="Заглавие 5">
             <a:extLst>
               <a:ext uri="{FF2B5EF4-FFF2-40B4-BE49-F238E27FC236}">
-                <a16:creationId xmlns:a16="http://schemas.microsoft.com/office/drawing/2014/main" id="{AF9C52BE-CF7C-4BB7-A6CE-7EB4E77530BC}"/>
+                <a16:creationId xmlns:a16="http://schemas.microsoft.com/office/drawing/2014/main" xmlns="" id="{AF9C52BE-CF7C-4BB7-A6CE-7EB4E77530BC}"/>
               </a:ext>
             </a:extLst>
           </p:cNvPr>
@@ -3482,7 +5305,7 @@
           <p:cNvPr id="7" name="Контейнер за съдържание 6">
             <a:extLst>
               <a:ext uri="{FF2B5EF4-FFF2-40B4-BE49-F238E27FC236}">
-                <a16:creationId xmlns:a16="http://schemas.microsoft.com/office/drawing/2014/main" id="{A5A3ACA2-6C31-4B20-8CFD-3CD15CAED879}"/>
+                <a16:creationId xmlns:a16="http://schemas.microsoft.com/office/drawing/2014/main" xmlns="" id="{A5A3ACA2-6C31-4B20-8CFD-3CD15CAED879}"/>
               </a:ext>
             </a:extLst>
           </p:cNvPr>
@@ -3608,6 +5431,13 @@
   <p:clrMapOvr>
     <a:masterClrMapping/>
   </p:clrMapOvr>
+  <p:timing>
+    <p:tnLst>
+      <p:par>
+        <p:cTn id="1" dur="indefinite" restart="never" nodeType="tmRoot"/>
+      </p:par>
+    </p:tnLst>
+  </p:timing>
 </p:sld>
 </file>
 
@@ -3633,7 +5463,7 @@
           <p:cNvPr id="4" name="Заглавие 3">
             <a:extLst>
               <a:ext uri="{FF2B5EF4-FFF2-40B4-BE49-F238E27FC236}">
-                <a16:creationId xmlns:a16="http://schemas.microsoft.com/office/drawing/2014/main" id="{2DA02DCB-263B-44EC-8540-F98F66430FF0}"/>
+                <a16:creationId xmlns:a16="http://schemas.microsoft.com/office/drawing/2014/main" xmlns="" id="{2DA02DCB-263B-44EC-8540-F98F66430FF0}"/>
               </a:ext>
             </a:extLst>
           </p:cNvPr>
@@ -3665,7 +5495,7 @@
           <p:cNvPr id="5" name="Контейнер за съдържание 4">
             <a:extLst>
               <a:ext uri="{FF2B5EF4-FFF2-40B4-BE49-F238E27FC236}">
-                <a16:creationId xmlns:a16="http://schemas.microsoft.com/office/drawing/2014/main" id="{DDFB02E2-D6D8-478E-B5E0-9F65AA872394}"/>
+                <a16:creationId xmlns:a16="http://schemas.microsoft.com/office/drawing/2014/main" xmlns="" id="{DDFB02E2-D6D8-478E-B5E0-9F65AA872394}"/>
               </a:ext>
             </a:extLst>
           </p:cNvPr>
@@ -3793,6 +5623,13 @@
   <p:clrMapOvr>
     <a:masterClrMapping/>
   </p:clrMapOvr>
+  <p:timing>
+    <p:tnLst>
+      <p:par>
+        <p:cTn id="1" dur="indefinite" restart="never" nodeType="tmRoot"/>
+      </p:par>
+    </p:tnLst>
+  </p:timing>
 </p:sld>
 </file>
 
@@ -3818,7 +5655,7 @@
           <p:cNvPr id="4" name="Заглавие 3">
             <a:extLst>
               <a:ext uri="{FF2B5EF4-FFF2-40B4-BE49-F238E27FC236}">
-                <a16:creationId xmlns:a16="http://schemas.microsoft.com/office/drawing/2014/main" id="{F994FA68-5700-4499-B4F3-D0D9FC01C467}"/>
+                <a16:creationId xmlns:a16="http://schemas.microsoft.com/office/drawing/2014/main" xmlns="" id="{F994FA68-5700-4499-B4F3-D0D9FC01C467}"/>
               </a:ext>
             </a:extLst>
           </p:cNvPr>
@@ -3850,7 +5687,7 @@
           <p:cNvPr id="5" name="Контейнер за съдържание 4">
             <a:extLst>
               <a:ext uri="{FF2B5EF4-FFF2-40B4-BE49-F238E27FC236}">
-                <a16:creationId xmlns:a16="http://schemas.microsoft.com/office/drawing/2014/main" id="{5723EDC1-0A3A-4D29-B301-B5CE4F596027}"/>
+                <a16:creationId xmlns:a16="http://schemas.microsoft.com/office/drawing/2014/main" xmlns="" id="{5723EDC1-0A3A-4D29-B301-B5CE4F596027}"/>
               </a:ext>
             </a:extLst>
           </p:cNvPr>
@@ -4818,7 +6655,7 @@
           <p:cNvPr id="7" name="Контейнер за съдържание 4">
             <a:extLst>
               <a:ext uri="{FF2B5EF4-FFF2-40B4-BE49-F238E27FC236}">
-                <a16:creationId xmlns:a16="http://schemas.microsoft.com/office/drawing/2014/main" id="{D1FC0D8D-C415-4BC2-8311-8249F516B139}"/>
+                <a16:creationId xmlns:a16="http://schemas.microsoft.com/office/drawing/2014/main" xmlns="" id="{D1FC0D8D-C415-4BC2-8311-8249F516B139}"/>
               </a:ext>
             </a:extLst>
           </p:cNvPr>
@@ -5053,6 +6890,13 @@
   <p:clrMapOvr>
     <a:masterClrMapping/>
   </p:clrMapOvr>
+  <p:timing>
+    <p:tnLst>
+      <p:par>
+        <p:cTn id="1" dur="indefinite" restart="never" nodeType="tmRoot"/>
+      </p:par>
+    </p:tnLst>
+  </p:timing>
 </p:sld>
 </file>
 
@@ -5078,7 +6922,7 @@
           <p:cNvPr id="4" name="Контейнер за съдържание 3">
             <a:extLst>
               <a:ext uri="{FF2B5EF4-FFF2-40B4-BE49-F238E27FC236}">
-                <a16:creationId xmlns:a16="http://schemas.microsoft.com/office/drawing/2014/main" id="{C8D24935-2131-4744-B547-EE9847624830}"/>
+                <a16:creationId xmlns:a16="http://schemas.microsoft.com/office/drawing/2014/main" xmlns="" id="{C8D24935-2131-4744-B547-EE9847624830}"/>
               </a:ext>
             </a:extLst>
           </p:cNvPr>
@@ -5130,7 +6974,7 @@
           <p:cNvPr id="2" name="Заглавие 1">
             <a:extLst>
               <a:ext uri="{FF2B5EF4-FFF2-40B4-BE49-F238E27FC236}">
-                <a16:creationId xmlns:a16="http://schemas.microsoft.com/office/drawing/2014/main" id="{26F95C0D-94D1-4764-B95E-3DECE9863930}"/>
+                <a16:creationId xmlns:a16="http://schemas.microsoft.com/office/drawing/2014/main" xmlns="" id="{26F95C0D-94D1-4764-B95E-3DECE9863930}"/>
               </a:ext>
             </a:extLst>
           </p:cNvPr>
@@ -5162,7 +7006,7 @@
           <p:cNvPr id="5" name="Контейнер за съдържание 4">
             <a:extLst>
               <a:ext uri="{FF2B5EF4-FFF2-40B4-BE49-F238E27FC236}">
-                <a16:creationId xmlns:a16="http://schemas.microsoft.com/office/drawing/2014/main" id="{281DAF93-996C-487B-8E81-E59F0EA5014C}"/>
+                <a16:creationId xmlns:a16="http://schemas.microsoft.com/office/drawing/2014/main" xmlns="" id="{281DAF93-996C-487B-8E81-E59F0EA5014C}"/>
               </a:ext>
             </a:extLst>
           </p:cNvPr>
@@ -5231,6 +7075,13 @@
   <p:clrMapOvr>
     <a:masterClrMapping/>
   </p:clrMapOvr>
+  <p:timing>
+    <p:tnLst>
+      <p:par>
+        <p:cTn id="1" dur="indefinite" restart="never" nodeType="tmRoot"/>
+      </p:par>
+    </p:tnLst>
+  </p:timing>
 </p:sld>
 </file>
 
@@ -5256,7 +7107,7 @@
           <p:cNvPr id="2" name="Заглавие 1">
             <a:extLst>
               <a:ext uri="{FF2B5EF4-FFF2-40B4-BE49-F238E27FC236}">
-                <a16:creationId xmlns:a16="http://schemas.microsoft.com/office/drawing/2014/main" id="{83CFA255-0659-470D-A425-9BE1E0AA2E07}"/>
+                <a16:creationId xmlns:a16="http://schemas.microsoft.com/office/drawing/2014/main" xmlns="" id="{83CFA255-0659-470D-A425-9BE1E0AA2E07}"/>
               </a:ext>
             </a:extLst>
           </p:cNvPr>
@@ -5304,7 +7155,7 @@
           <p:cNvPr id="3" name="Контейнер за съдържание 2">
             <a:extLst>
               <a:ext uri="{FF2B5EF4-FFF2-40B4-BE49-F238E27FC236}">
-                <a16:creationId xmlns:a16="http://schemas.microsoft.com/office/drawing/2014/main" id="{85D53831-7104-4FAE-A636-A0D8CA38883B}"/>
+                <a16:creationId xmlns:a16="http://schemas.microsoft.com/office/drawing/2014/main" xmlns="" id="{85D53831-7104-4FAE-A636-A0D8CA38883B}"/>
               </a:ext>
             </a:extLst>
           </p:cNvPr>
@@ -5457,6 +7308,13 @@
   <p:clrMapOvr>
     <a:masterClrMapping/>
   </p:clrMapOvr>
+  <p:timing>
+    <p:tnLst>
+      <p:par>
+        <p:cTn id="1" dur="indefinite" restart="never" nodeType="tmRoot"/>
+      </p:par>
+    </p:tnLst>
+  </p:timing>
 </p:sld>
 </file>
 
@@ -5482,7 +7340,7 @@
           <p:cNvPr id="2" name="Заглавие 1">
             <a:extLst>
               <a:ext uri="{FF2B5EF4-FFF2-40B4-BE49-F238E27FC236}">
-                <a16:creationId xmlns:a16="http://schemas.microsoft.com/office/drawing/2014/main" id="{CBAA30A0-82D2-4B77-A9FB-608F082876E3}"/>
+                <a16:creationId xmlns:a16="http://schemas.microsoft.com/office/drawing/2014/main" xmlns="" id="{CBAA30A0-82D2-4B77-A9FB-608F082876E3}"/>
               </a:ext>
             </a:extLst>
           </p:cNvPr>
@@ -5518,7 +7376,7 @@
           <p:cNvPr id="3" name="Контейнер за съдържание 2">
             <a:extLst>
               <a:ext uri="{FF2B5EF4-FFF2-40B4-BE49-F238E27FC236}">
-                <a16:creationId xmlns:a16="http://schemas.microsoft.com/office/drawing/2014/main" id="{5FB44CFC-8C34-4A01-AF74-7FF6AF22077E}"/>
+                <a16:creationId xmlns:a16="http://schemas.microsoft.com/office/drawing/2014/main" xmlns="" id="{5FB44CFC-8C34-4A01-AF74-7FF6AF22077E}"/>
               </a:ext>
             </a:extLst>
           </p:cNvPr>
@@ -5664,6 +7522,13 @@
   <p:clrMapOvr>
     <a:masterClrMapping/>
   </p:clrMapOvr>
+  <p:timing>
+    <p:tnLst>
+      <p:par>
+        <p:cTn id="1" dur="indefinite" restart="never" nodeType="tmRoot"/>
+      </p:par>
+    </p:tnLst>
+  </p:timing>
 </p:sld>
 </file>
 
@@ -5689,7 +7554,7 @@
           <p:cNvPr id="4" name="Контейнер за съдържание 3">
             <a:extLst>
               <a:ext uri="{FF2B5EF4-FFF2-40B4-BE49-F238E27FC236}">
-                <a16:creationId xmlns:a16="http://schemas.microsoft.com/office/drawing/2014/main" id="{755B6AB4-2083-42DF-A66E-2DEF8C1844F3}"/>
+                <a16:creationId xmlns:a16="http://schemas.microsoft.com/office/drawing/2014/main" xmlns="" id="{755B6AB4-2083-42DF-A66E-2DEF8C1844F3}"/>
               </a:ext>
             </a:extLst>
           </p:cNvPr>
@@ -5708,7 +7573,7 @@
         </p:spPr>
         <p:txBody>
           <a:bodyPr>
-            <a:normAutofit lnSpcReduction="10000"/>
+            <a:normAutofit/>
           </a:bodyPr>
           <a:lstStyle/>
           <a:p>
@@ -6249,7 +8114,7 @@
               <a:t>(++</a:t>
             </a:r>
             <a:r>
-              <a:rPr lang="en-US" sz="2400" dirty="0">
+              <a:rPr lang="en-US" sz="2400">
                 <a:latin typeface="Times New Roman" panose="02020603050405020304" pitchFamily="18" charset="0"/>
                 <a:ea typeface="Times New Roman" panose="02020603050405020304" pitchFamily="18" charset="0"/>
                 <a:cs typeface="Times New Roman" panose="02020603050405020304" pitchFamily="18" charset="0"/>
@@ -6257,7 +8122,7 @@
               <a:t>index</a:t>
             </a:r>
             <a:r>
-              <a:rPr lang="en-US" sz="2400" dirty="0">
+              <a:rPr lang="en-US" sz="2400" smtClean="0">
                 <a:solidFill>
                   <a:srgbClr val="666666"/>
                 </a:solidFill>
@@ -6267,6 +8132,14 @@
               </a:rPr>
               <a:t>);</a:t>
             </a:r>
+            <a:endParaRPr lang="en-US" sz="2400" dirty="0" smtClean="0">
+              <a:solidFill>
+                <a:srgbClr val="666666"/>
+              </a:solidFill>
+              <a:latin typeface="Times New Roman" panose="02020603050405020304" pitchFamily="18" charset="0"/>
+              <a:ea typeface="Times New Roman" panose="02020603050405020304" pitchFamily="18" charset="0"/>
+              <a:cs typeface="Times New Roman" panose="02020603050405020304" pitchFamily="18" charset="0"/>
+            </a:endParaRPr>
           </a:p>
           <a:p>
             <a:pPr marL="0" marR="0" indent="0">
@@ -6290,10 +8163,10 @@
                 <a:ea typeface="Times New Roman" panose="02020603050405020304" pitchFamily="18" charset="0"/>
                 <a:cs typeface="Times New Roman" panose="02020603050405020304" pitchFamily="18" charset="0"/>
               </a:rPr>
-              <a:t>            </a:t>
-            </a:r>
-            <a:r>
-              <a:rPr lang="en-US" sz="2400" dirty="0" err="1">
+              <a:t>	</a:t>
+            </a:r>
+            <a:r>
+              <a:rPr lang="en-US" sz="2400" dirty="0" smtClean="0">
                 <a:solidFill>
                   <a:srgbClr val="666666"/>
                 </a:solidFill>
@@ -6301,18 +8174,7 @@
                 <a:ea typeface="Times New Roman" panose="02020603050405020304" pitchFamily="18" charset="0"/>
                 <a:cs typeface="Times New Roman" panose="02020603050405020304" pitchFamily="18" charset="0"/>
               </a:rPr>
-              <a:t>e.onComplete</a:t>
-            </a:r>
-            <a:r>
-              <a:rPr lang="en-US" sz="2400" dirty="0">
-                <a:solidFill>
-                  <a:srgbClr val="666666"/>
-                </a:solidFill>
-                <a:latin typeface="Times New Roman" panose="02020603050405020304" pitchFamily="18" charset="0"/>
-                <a:ea typeface="Times New Roman" panose="02020603050405020304" pitchFamily="18" charset="0"/>
-                <a:cs typeface="Times New Roman" panose="02020603050405020304" pitchFamily="18" charset="0"/>
-              </a:rPr>
-              <a:t>();</a:t>
+              <a:t>						}</a:t>
             </a:r>
             <a:endParaRPr lang="en-US" sz="2400" dirty="0">
               <a:latin typeface="Calibri" panose="020F0502020204030204" pitchFamily="34" charset="0"/>
@@ -6339,7 +8201,7 @@
                 <a:ea typeface="Times New Roman" panose="02020603050405020304" pitchFamily="18" charset="0"/>
                 <a:cs typeface="Times New Roman" panose="02020603050405020304" pitchFamily="18" charset="0"/>
               </a:rPr>
-              <a:t>        </a:t>
+              <a:t>    </a:t>
             </a:r>
             <a:r>
               <a:rPr lang="en-US" sz="2400" dirty="0">
@@ -6350,7 +8212,7 @@
                 <a:ea typeface="Times New Roman" panose="02020603050405020304" pitchFamily="18" charset="0"/>
                 <a:cs typeface="Times New Roman" panose="02020603050405020304" pitchFamily="18" charset="0"/>
               </a:rPr>
-              <a:t>}</a:t>
+              <a:t>});</a:t>
             </a:r>
             <a:endParaRPr lang="en-US" sz="2400" dirty="0">
               <a:latin typeface="Calibri" panose="020F0502020204030204" pitchFamily="34" charset="0"/>
@@ -6373,44 +8235,6 @@
             </a:pPr>
             <a:r>
               <a:rPr lang="en-US" sz="2400" dirty="0">
-                <a:latin typeface="Times New Roman" panose="02020603050405020304" pitchFamily="18" charset="0"/>
-                <a:ea typeface="Times New Roman" panose="02020603050405020304" pitchFamily="18" charset="0"/>
-                <a:cs typeface="Times New Roman" panose="02020603050405020304" pitchFamily="18" charset="0"/>
-              </a:rPr>
-              <a:t>    </a:t>
-            </a:r>
-            <a:r>
-              <a:rPr lang="en-US" sz="2400" dirty="0">
-                <a:solidFill>
-                  <a:srgbClr val="666666"/>
-                </a:solidFill>
-                <a:latin typeface="Times New Roman" panose="02020603050405020304" pitchFamily="18" charset="0"/>
-                <a:ea typeface="Times New Roman" panose="02020603050405020304" pitchFamily="18" charset="0"/>
-                <a:cs typeface="Times New Roman" panose="02020603050405020304" pitchFamily="18" charset="0"/>
-              </a:rPr>
-              <a:t>});</a:t>
-            </a:r>
-            <a:endParaRPr lang="en-US" sz="2400" dirty="0">
-              <a:latin typeface="Calibri" panose="020F0502020204030204" pitchFamily="34" charset="0"/>
-              <a:ea typeface="Times New Roman" panose="02020603050405020304" pitchFamily="18" charset="0"/>
-              <a:cs typeface="Times New Roman" panose="02020603050405020304" pitchFamily="18" charset="0"/>
-            </a:endParaRPr>
-          </a:p>
-          <a:p>
-            <a:pPr marL="0" marR="0" indent="0">
-              <a:lnSpc>
-                <a:spcPct val="107000"/>
-              </a:lnSpc>
-              <a:spcBef>
-                <a:spcPts val="0"/>
-              </a:spcBef>
-              <a:spcAft>
-                <a:spcPts val="0"/>
-              </a:spcAft>
-              <a:buNone/>
-            </a:pPr>
-            <a:r>
-              <a:rPr lang="en-US" sz="2400" dirty="0">
                 <a:solidFill>
                   <a:srgbClr val="666666"/>
                 </a:solidFill>
@@ -6429,7 +8253,7 @@
           <p:cNvPr id="2" name="Заглавие 1">
             <a:extLst>
               <a:ext uri="{FF2B5EF4-FFF2-40B4-BE49-F238E27FC236}">
-                <a16:creationId xmlns:a16="http://schemas.microsoft.com/office/drawing/2014/main" id="{123DB5C9-6192-487A-A9A3-C51F05950985}"/>
+                <a16:creationId xmlns:a16="http://schemas.microsoft.com/office/drawing/2014/main" xmlns="" id="{123DB5C9-6192-487A-A9A3-C51F05950985}"/>
               </a:ext>
             </a:extLst>
           </p:cNvPr>
@@ -6465,7 +8289,7 @@
           <p:cNvPr id="5" name="Контейнер за съдържание 4">
             <a:extLst>
               <a:ext uri="{FF2B5EF4-FFF2-40B4-BE49-F238E27FC236}">
-                <a16:creationId xmlns:a16="http://schemas.microsoft.com/office/drawing/2014/main" id="{0070CB68-2442-4FA5-87A3-6A8C83E92630}"/>
+                <a16:creationId xmlns:a16="http://schemas.microsoft.com/office/drawing/2014/main" xmlns="" id="{0070CB68-2442-4FA5-87A3-6A8C83E92630}"/>
               </a:ext>
             </a:extLst>
           </p:cNvPr>
@@ -6971,6 +8795,13 @@
   <p:clrMapOvr>
     <a:masterClrMapping/>
   </p:clrMapOvr>
+  <p:timing>
+    <p:tnLst>
+      <p:par>
+        <p:cTn id="1" dur="indefinite" restart="never" nodeType="tmRoot"/>
+      </p:par>
+    </p:tnLst>
+  </p:timing>
 </p:sld>
 </file>
 
@@ -7142,4 +8973,265 @@
     </a:ext>
   </a:extLst>
 </a:theme>
+</file>
+
+<file path=ppt/theme/theme2.xml><?xml version="1.0" encoding="utf-8"?>
+<a:theme xmlns:a="http://schemas.openxmlformats.org/drawingml/2006/main" name="Office Theme">
+  <a:themeElements>
+    <a:clrScheme name="Office">
+      <a:dk1>
+        <a:sysClr val="windowText" lastClr="000000"/>
+      </a:dk1>
+      <a:lt1>
+        <a:sysClr val="window" lastClr="FFFFFF"/>
+      </a:lt1>
+      <a:dk2>
+        <a:srgbClr val="44546A"/>
+      </a:dk2>
+      <a:lt2>
+        <a:srgbClr val="E7E6E6"/>
+      </a:lt2>
+      <a:accent1>
+        <a:srgbClr val="4472C4"/>
+      </a:accent1>
+      <a:accent2>
+        <a:srgbClr val="ED7D31"/>
+      </a:accent2>
+      <a:accent3>
+        <a:srgbClr val="A5A5A5"/>
+      </a:accent3>
+      <a:accent4>
+        <a:srgbClr val="FFC000"/>
+      </a:accent4>
+      <a:accent5>
+        <a:srgbClr val="5B9BD5"/>
+      </a:accent5>
+      <a:accent6>
+        <a:srgbClr val="70AD47"/>
+      </a:accent6>
+      <a:hlink>
+        <a:srgbClr val="0563C1"/>
+      </a:hlink>
+      <a:folHlink>
+        <a:srgbClr val="954F72"/>
+      </a:folHlink>
+    </a:clrScheme>
+    <a:fontScheme name="Office">
+      <a:majorFont>
+        <a:latin typeface="Calibri Light" panose="020F0302020204030204"/>
+        <a:ea typeface=""/>
+        <a:cs typeface=""/>
+        <a:font script="Jpan" typeface="Yu Gothic Light"/>
+        <a:font script="Hang" typeface="맑은 고딕"/>
+        <a:font script="Hans" typeface="DengXian Light"/>
+        <a:font script="Hant" typeface="新細明體"/>
+        <a:font script="Arab" typeface="Times New Roman"/>
+        <a:font script="Hebr" typeface="Times New Roman"/>
+        <a:font script="Thai" typeface="Angsana New"/>
+        <a:font script="Ethi" typeface="Nyala"/>
+        <a:font script="Beng" typeface="Vrinda"/>
+        <a:font script="Gujr" typeface="Shruti"/>
+        <a:font script="Khmr" typeface="MoolBoran"/>
+        <a:font script="Knda" typeface="Tunga"/>
+        <a:font script="Guru" typeface="Raavi"/>
+        <a:font script="Cans" typeface="Euphemia"/>
+        <a:font script="Cher" typeface="Plantagenet Cherokee"/>
+        <a:font script="Yiii" typeface="Microsoft Yi Baiti"/>
+        <a:font script="Tibt" typeface="Microsoft Himalaya"/>
+        <a:font script="Thaa" typeface="MV Boli"/>
+        <a:font script="Deva" typeface="Mangal"/>
+        <a:font script="Telu" typeface="Gautami"/>
+        <a:font script="Taml" typeface="Latha"/>
+        <a:font script="Syrc" typeface="Estrangelo Edessa"/>
+        <a:font script="Orya" typeface="Kalinga"/>
+        <a:font script="Mlym" typeface="Kartika"/>
+        <a:font script="Laoo" typeface="DokChampa"/>
+        <a:font script="Sinh" typeface="Iskoola Pota"/>
+        <a:font script="Mong" typeface="Mongolian Baiti"/>
+        <a:font script="Viet" typeface="Times New Roman"/>
+        <a:font script="Uigh" typeface="Microsoft Uighur"/>
+        <a:font script="Geor" typeface="Sylfaen"/>
+      </a:majorFont>
+      <a:minorFont>
+        <a:latin typeface="Calibri" panose="020F0502020204030204"/>
+        <a:ea typeface=""/>
+        <a:cs typeface=""/>
+        <a:font script="Jpan" typeface="Yu Gothic"/>
+        <a:font script="Hang" typeface="맑은 고딕"/>
+        <a:font script="Hans" typeface="DengXian"/>
+        <a:font script="Hant" typeface="新細明體"/>
+        <a:font script="Arab" typeface="Arial"/>
+        <a:font script="Hebr" typeface="Arial"/>
+        <a:font script="Thai" typeface="Cordia New"/>
+        <a:font script="Ethi" typeface="Nyala"/>
+        <a:font script="Beng" typeface="Vrinda"/>
+        <a:font script="Gujr" typeface="Shruti"/>
+        <a:font script="Khmr" typeface="DaunPenh"/>
+        <a:font script="Knda" typeface="Tunga"/>
+        <a:font script="Guru" typeface="Raavi"/>
+        <a:font script="Cans" typeface="Euphemia"/>
+        <a:font script="Cher" typeface="Plantagenet Cherokee"/>
+        <a:font script="Yiii" typeface="Microsoft Yi Baiti"/>
+        <a:font script="Tibt" typeface="Microsoft Himalaya"/>
+        <a:font script="Thaa" typeface="MV Boli"/>
+        <a:font script="Deva" typeface="Mangal"/>
+        <a:font script="Telu" typeface="Gautami"/>
+        <a:font script="Taml" typeface="Latha"/>
+        <a:font script="Syrc" typeface="Estrangelo Edessa"/>
+        <a:font script="Orya" typeface="Kalinga"/>
+        <a:font script="Mlym" typeface="Kartika"/>
+        <a:font script="Laoo" typeface="DokChampa"/>
+        <a:font script="Sinh" typeface="Iskoola Pota"/>
+        <a:font script="Mong" typeface="Mongolian Baiti"/>
+        <a:font script="Viet" typeface="Arial"/>
+        <a:font script="Uigh" typeface="Microsoft Uighur"/>
+        <a:font script="Geor" typeface="Sylfaen"/>
+      </a:minorFont>
+    </a:fontScheme>
+    <a:fmtScheme name="Office">
+      <a:fillStyleLst>
+        <a:solidFill>
+          <a:schemeClr val="phClr"/>
+        </a:solidFill>
+        <a:gradFill rotWithShape="1">
+          <a:gsLst>
+            <a:gs pos="0">
+              <a:schemeClr val="phClr">
+                <a:lumMod val="110000"/>
+                <a:satMod val="105000"/>
+                <a:tint val="67000"/>
+              </a:schemeClr>
+            </a:gs>
+            <a:gs pos="50000">
+              <a:schemeClr val="phClr">
+                <a:lumMod val="105000"/>
+                <a:satMod val="103000"/>
+                <a:tint val="73000"/>
+              </a:schemeClr>
+            </a:gs>
+            <a:gs pos="100000">
+              <a:schemeClr val="phClr">
+                <a:lumMod val="105000"/>
+                <a:satMod val="109000"/>
+                <a:tint val="81000"/>
+              </a:schemeClr>
+            </a:gs>
+          </a:gsLst>
+          <a:lin ang="5400000" scaled="0"/>
+        </a:gradFill>
+        <a:gradFill rotWithShape="1">
+          <a:gsLst>
+            <a:gs pos="0">
+              <a:schemeClr val="phClr">
+                <a:satMod val="103000"/>
+                <a:lumMod val="102000"/>
+                <a:tint val="94000"/>
+              </a:schemeClr>
+            </a:gs>
+            <a:gs pos="50000">
+              <a:schemeClr val="phClr">
+                <a:satMod val="110000"/>
+                <a:lumMod val="100000"/>
+                <a:shade val="100000"/>
+              </a:schemeClr>
+            </a:gs>
+            <a:gs pos="100000">
+              <a:schemeClr val="phClr">
+                <a:lumMod val="99000"/>
+                <a:satMod val="120000"/>
+                <a:shade val="78000"/>
+              </a:schemeClr>
+            </a:gs>
+          </a:gsLst>
+          <a:lin ang="5400000" scaled="0"/>
+        </a:gradFill>
+      </a:fillStyleLst>
+      <a:lnStyleLst>
+        <a:ln w="6350" cap="flat" cmpd="sng" algn="ctr">
+          <a:solidFill>
+            <a:schemeClr val="phClr"/>
+          </a:solidFill>
+          <a:prstDash val="solid"/>
+          <a:miter lim="800000"/>
+        </a:ln>
+        <a:ln w="12700" cap="flat" cmpd="sng" algn="ctr">
+          <a:solidFill>
+            <a:schemeClr val="phClr"/>
+          </a:solidFill>
+          <a:prstDash val="solid"/>
+          <a:miter lim="800000"/>
+        </a:ln>
+        <a:ln w="19050" cap="flat" cmpd="sng" algn="ctr">
+          <a:solidFill>
+            <a:schemeClr val="phClr"/>
+          </a:solidFill>
+          <a:prstDash val="solid"/>
+          <a:miter lim="800000"/>
+        </a:ln>
+      </a:lnStyleLst>
+      <a:effectStyleLst>
+        <a:effectStyle>
+          <a:effectLst/>
+        </a:effectStyle>
+        <a:effectStyle>
+          <a:effectLst/>
+        </a:effectStyle>
+        <a:effectStyle>
+          <a:effectLst>
+            <a:outerShdw blurRad="57150" dist="19050" dir="5400000" algn="ctr" rotWithShape="0">
+              <a:srgbClr val="000000">
+                <a:alpha val="63000"/>
+              </a:srgbClr>
+            </a:outerShdw>
+          </a:effectLst>
+        </a:effectStyle>
+      </a:effectStyleLst>
+      <a:bgFillStyleLst>
+        <a:solidFill>
+          <a:schemeClr val="phClr"/>
+        </a:solidFill>
+        <a:solidFill>
+          <a:schemeClr val="phClr">
+            <a:tint val="95000"/>
+            <a:satMod val="170000"/>
+          </a:schemeClr>
+        </a:solidFill>
+        <a:gradFill rotWithShape="1">
+          <a:gsLst>
+            <a:gs pos="0">
+              <a:schemeClr val="phClr">
+                <a:tint val="93000"/>
+                <a:satMod val="150000"/>
+                <a:shade val="98000"/>
+                <a:lumMod val="102000"/>
+              </a:schemeClr>
+            </a:gs>
+            <a:gs pos="50000">
+              <a:schemeClr val="phClr">
+                <a:tint val="98000"/>
+                <a:satMod val="130000"/>
+                <a:shade val="90000"/>
+                <a:lumMod val="103000"/>
+              </a:schemeClr>
+            </a:gs>
+            <a:gs pos="100000">
+              <a:schemeClr val="phClr">
+                <a:shade val="63000"/>
+                <a:satMod val="120000"/>
+              </a:schemeClr>
+            </a:gs>
+          </a:gsLst>
+          <a:lin ang="5400000" scaled="0"/>
+        </a:gradFill>
+      </a:bgFillStyleLst>
+    </a:fmtScheme>
+  </a:themeElements>
+  <a:objectDefaults/>
+  <a:extraClrSchemeLst/>
+  <a:extLst>
+    <a:ext uri="{05A4C25C-085E-4340-85A3-A5531E510DB2}">
+      <thm15:themeFamily xmlns:thm15="http://schemas.microsoft.com/office/thememl/2012/main" name="Office Theme" id="{62F939B6-93AF-4DB8-9C6B-D6C7DFDC589F}" vid="{4A3C46E8-61CC-4603-A589-7422A47A8E4A}"/>
+    </a:ext>
+  </a:extLst>
+</a:theme>
 </file>
</xml_diff>